<commit_message>
2017-07-25 SCR doc added : First draft
</commit_message>
<xml_diff>
--- a/doc/tex/sdf/simplified_coherent_receiver/figures/Tx_Rx.pptx
+++ b/doc/tex/sdf/simplified_coherent_receiver/figures/Tx_Rx.pptx
@@ -104,6 +104,11 @@
       </a:defRPr>
     </a:lvl9pPr>
   </p:defaultTextStyle>
+  <p:extLst>
+    <p:ext uri="{EFAFB233-063F-42B5-8137-9DF3F51BA10A}">
+      <p15:sldGuideLst xmlns:p15="http://schemas.microsoft.com/office/powerpoint/2012/main"/>
+    </p:ext>
+  </p:extLst>
 </p:presentation>
 </file>
 
@@ -238,7 +243,7 @@
           <a:p>
             <a:fld id="{BBEA5209-9876-4E05-9D10-09D3A401A5DA}" type="datetimeFigureOut">
               <a:rPr lang="en-US" smtClean="0"/>
-              <a:t>7/25/2017</a:t>
+              <a:t>7/26/2017</a:t>
             </a:fld>
             <a:endParaRPr lang="en-US"/>
           </a:p>
@@ -408,7 +413,7 @@
           <a:p>
             <a:fld id="{BBEA5209-9876-4E05-9D10-09D3A401A5DA}" type="datetimeFigureOut">
               <a:rPr lang="en-US" smtClean="0"/>
-              <a:t>7/25/2017</a:t>
+              <a:t>7/26/2017</a:t>
             </a:fld>
             <a:endParaRPr lang="en-US"/>
           </a:p>
@@ -588,7 +593,7 @@
           <a:p>
             <a:fld id="{BBEA5209-9876-4E05-9D10-09D3A401A5DA}" type="datetimeFigureOut">
               <a:rPr lang="en-US" smtClean="0"/>
-              <a:t>7/25/2017</a:t>
+              <a:t>7/26/2017</a:t>
             </a:fld>
             <a:endParaRPr lang="en-US"/>
           </a:p>
@@ -758,7 +763,7 @@
           <a:p>
             <a:fld id="{BBEA5209-9876-4E05-9D10-09D3A401A5DA}" type="datetimeFigureOut">
               <a:rPr lang="en-US" smtClean="0"/>
-              <a:t>7/25/2017</a:t>
+              <a:t>7/26/2017</a:t>
             </a:fld>
             <a:endParaRPr lang="en-US"/>
           </a:p>
@@ -1004,7 +1009,7 @@
           <a:p>
             <a:fld id="{BBEA5209-9876-4E05-9D10-09D3A401A5DA}" type="datetimeFigureOut">
               <a:rPr lang="en-US" smtClean="0"/>
-              <a:t>7/25/2017</a:t>
+              <a:t>7/26/2017</a:t>
             </a:fld>
             <a:endParaRPr lang="en-US"/>
           </a:p>
@@ -1236,7 +1241,7 @@
           <a:p>
             <a:fld id="{BBEA5209-9876-4E05-9D10-09D3A401A5DA}" type="datetimeFigureOut">
               <a:rPr lang="en-US" smtClean="0"/>
-              <a:t>7/25/2017</a:t>
+              <a:t>7/26/2017</a:t>
             </a:fld>
             <a:endParaRPr lang="en-US"/>
           </a:p>
@@ -1603,7 +1608,7 @@
           <a:p>
             <a:fld id="{BBEA5209-9876-4E05-9D10-09D3A401A5DA}" type="datetimeFigureOut">
               <a:rPr lang="en-US" smtClean="0"/>
-              <a:t>7/25/2017</a:t>
+              <a:t>7/26/2017</a:t>
             </a:fld>
             <a:endParaRPr lang="en-US"/>
           </a:p>
@@ -1721,7 +1726,7 @@
           <a:p>
             <a:fld id="{BBEA5209-9876-4E05-9D10-09D3A401A5DA}" type="datetimeFigureOut">
               <a:rPr lang="en-US" smtClean="0"/>
-              <a:t>7/25/2017</a:t>
+              <a:t>7/26/2017</a:t>
             </a:fld>
             <a:endParaRPr lang="en-US"/>
           </a:p>
@@ -1816,7 +1821,7 @@
           <a:p>
             <a:fld id="{BBEA5209-9876-4E05-9D10-09D3A401A5DA}" type="datetimeFigureOut">
               <a:rPr lang="en-US" smtClean="0"/>
-              <a:t>7/25/2017</a:t>
+              <a:t>7/26/2017</a:t>
             </a:fld>
             <a:endParaRPr lang="en-US"/>
           </a:p>
@@ -2093,7 +2098,7 @@
           <a:p>
             <a:fld id="{BBEA5209-9876-4E05-9D10-09D3A401A5DA}" type="datetimeFigureOut">
               <a:rPr lang="en-US" smtClean="0"/>
-              <a:t>7/25/2017</a:t>
+              <a:t>7/26/2017</a:t>
             </a:fld>
             <a:endParaRPr lang="en-US"/>
           </a:p>
@@ -2346,7 +2351,7 @@
           <a:p>
             <a:fld id="{BBEA5209-9876-4E05-9D10-09D3A401A5DA}" type="datetimeFigureOut">
               <a:rPr lang="en-US" smtClean="0"/>
-              <a:t>7/25/2017</a:t>
+              <a:t>7/26/2017</a:t>
             </a:fld>
             <a:endParaRPr lang="en-US"/>
           </a:p>
@@ -2559,7 +2564,7 @@
           <a:p>
             <a:fld id="{BBEA5209-9876-4E05-9D10-09D3A401A5DA}" type="datetimeFigureOut">
               <a:rPr lang="en-US" smtClean="0"/>
-              <a:t>7/25/2017</a:t>
+              <a:t>7/26/2017</a:t>
             </a:fld>
             <a:endParaRPr lang="en-US"/>
           </a:p>
@@ -2966,16 +2971,16 @@
       </p:grpSpPr>
       <p:grpSp>
         <p:nvGrpSpPr>
-          <p:cNvPr id="127" name="Group 126"/>
+          <p:cNvPr id="115" name="Group 114"/>
           <p:cNvGrpSpPr/>
           <p:nvPr/>
         </p:nvGrpSpPr>
         <p:grpSpPr>
           <a:xfrm>
-            <a:off x="228600" y="1400175"/>
-            <a:ext cx="11782425" cy="3333750"/>
-            <a:chOff x="228600" y="1400175"/>
-            <a:chExt cx="11782425" cy="3333750"/>
+            <a:off x="216377" y="1280981"/>
+            <a:ext cx="11739192" cy="3983228"/>
+            <a:chOff x="228600" y="1374507"/>
+            <a:chExt cx="11782425" cy="3359418"/>
           </a:xfrm>
         </p:grpSpPr>
         <p:sp>
@@ -3027,6 +3032,708 @@
             </a:p>
           </p:txBody>
         </p:sp>
+        <p:cxnSp>
+          <p:nvCxnSpPr>
+            <p:cNvPr id="73" name="Straight Arrow Connector 72"/>
+            <p:cNvCxnSpPr>
+              <a:stCxn id="62" idx="3"/>
+              <a:endCxn id="103" idx="1"/>
+            </p:cNvCxnSpPr>
+            <p:nvPr/>
+          </p:nvCxnSpPr>
+          <p:spPr>
+            <a:xfrm flipV="1">
+              <a:off x="8768470" y="2485422"/>
+              <a:ext cx="510488" cy="1"/>
+            </a:xfrm>
+            <a:prstGeom prst="straightConnector1">
+              <a:avLst/>
+            </a:prstGeom>
+            <a:ln w="28575">
+              <a:solidFill>
+                <a:srgbClr val="00B0F0"/>
+              </a:solidFill>
+              <a:tailEnd type="triangle"/>
+            </a:ln>
+          </p:spPr>
+          <p:style>
+            <a:lnRef idx="1">
+              <a:schemeClr val="accent1"/>
+            </a:lnRef>
+            <a:fillRef idx="0">
+              <a:schemeClr val="accent1"/>
+            </a:fillRef>
+            <a:effectRef idx="0">
+              <a:schemeClr val="accent1"/>
+            </a:effectRef>
+            <a:fontRef idx="minor">
+              <a:schemeClr val="tx1"/>
+            </a:fontRef>
+          </p:style>
+        </p:cxnSp>
+        <p:sp>
+          <p:nvSpPr>
+            <p:cNvPr id="78" name="Rectangle 77"/>
+            <p:cNvSpPr/>
+            <p:nvPr/>
+          </p:nvSpPr>
+          <p:spPr>
+            <a:xfrm>
+              <a:off x="10453537" y="1878810"/>
+              <a:ext cx="901640" cy="2391669"/>
+            </a:xfrm>
+            <a:prstGeom prst="rect">
+              <a:avLst/>
+            </a:prstGeom>
+            <a:solidFill>
+              <a:schemeClr val="accent6">
+                <a:lumMod val="60000"/>
+                <a:lumOff val="40000"/>
+              </a:schemeClr>
+            </a:solidFill>
+            <a:ln w="28575">
+              <a:solidFill>
+                <a:schemeClr val="tx1"/>
+              </a:solidFill>
+            </a:ln>
+          </p:spPr>
+          <p:style>
+            <a:lnRef idx="2">
+              <a:schemeClr val="dk1"/>
+            </a:lnRef>
+            <a:fillRef idx="1">
+              <a:schemeClr val="lt1"/>
+            </a:fillRef>
+            <a:effectRef idx="0">
+              <a:schemeClr val="dk1"/>
+            </a:effectRef>
+            <a:fontRef idx="minor">
+              <a:schemeClr val="dk1"/>
+            </a:fontRef>
+          </p:style>
+          <p:txBody>
+            <a:bodyPr rtlCol="0" anchor="ctr"/>
+            <a:lstStyle/>
+            <a:p>
+              <a:pPr algn="ctr"/>
+              <a:r>
+                <a:rPr lang="en-US" sz="2000" b="1" dirty="0" smtClean="0">
+                  <a:latin typeface="Times New Roman" panose="02020603050405020304" pitchFamily="18" charset="0"/>
+                  <a:cs typeface="Times New Roman" panose="02020603050405020304" pitchFamily="18" charset="0"/>
+                </a:rPr>
+                <a:t>Rx</a:t>
+              </a:r>
+            </a:p>
+            <a:p>
+              <a:pPr algn="ctr"/>
+              <a:r>
+                <a:rPr lang="en-US" sz="2000" b="1" dirty="0" smtClean="0">
+                  <a:latin typeface="Times New Roman" panose="02020603050405020304" pitchFamily="18" charset="0"/>
+                  <a:cs typeface="Times New Roman" panose="02020603050405020304" pitchFamily="18" charset="0"/>
+                </a:rPr>
+                <a:t>DSP</a:t>
+              </a:r>
+              <a:endParaRPr lang="en-US" sz="2000" b="1" dirty="0">
+                <a:latin typeface="Times New Roman" panose="02020603050405020304" pitchFamily="18" charset="0"/>
+                <a:cs typeface="Times New Roman" panose="02020603050405020304" pitchFamily="18" charset="0"/>
+              </a:endParaRPr>
+            </a:p>
+          </p:txBody>
+        </p:sp>
+        <p:cxnSp>
+          <p:nvCxnSpPr>
+            <p:cNvPr id="92" name="Straight Arrow Connector 91"/>
+            <p:cNvCxnSpPr/>
+            <p:nvPr/>
+          </p:nvCxnSpPr>
+          <p:spPr>
+            <a:xfrm flipV="1">
+              <a:off x="11355177" y="3074642"/>
+              <a:ext cx="655848" cy="1"/>
+            </a:xfrm>
+            <a:prstGeom prst="straightConnector1">
+              <a:avLst/>
+            </a:prstGeom>
+            <a:ln w="28575">
+              <a:solidFill>
+                <a:schemeClr val="tx1"/>
+              </a:solidFill>
+              <a:tailEnd type="triangle"/>
+            </a:ln>
+          </p:spPr>
+          <p:style>
+            <a:lnRef idx="1">
+              <a:schemeClr val="accent1"/>
+            </a:lnRef>
+            <a:fillRef idx="0">
+              <a:schemeClr val="accent1"/>
+            </a:fillRef>
+            <a:effectRef idx="0">
+              <a:schemeClr val="accent1"/>
+            </a:effectRef>
+            <a:fontRef idx="minor">
+              <a:schemeClr val="tx1"/>
+            </a:fontRef>
+          </p:style>
+        </p:cxnSp>
+        <p:sp>
+          <p:nvSpPr>
+            <p:cNvPr id="101" name="Rectangle 100"/>
+            <p:cNvSpPr/>
+            <p:nvPr/>
+          </p:nvSpPr>
+          <p:spPr>
+            <a:xfrm>
+              <a:off x="10429359" y="1489843"/>
+              <a:ext cx="945100" cy="291826"/>
+            </a:xfrm>
+            <a:prstGeom prst="rect">
+              <a:avLst/>
+            </a:prstGeom>
+            <a:solidFill>
+              <a:schemeClr val="accent1">
+                <a:alpha val="0"/>
+              </a:schemeClr>
+            </a:solidFill>
+            <a:ln>
+              <a:solidFill>
+                <a:schemeClr val="bg1"/>
+              </a:solidFill>
+            </a:ln>
+          </p:spPr>
+          <p:style>
+            <a:lnRef idx="2">
+              <a:schemeClr val="accent1">
+                <a:shade val="50000"/>
+              </a:schemeClr>
+            </a:lnRef>
+            <a:fillRef idx="1">
+              <a:schemeClr val="accent1"/>
+            </a:fillRef>
+            <a:effectRef idx="0">
+              <a:schemeClr val="accent1"/>
+            </a:effectRef>
+            <a:fontRef idx="minor">
+              <a:schemeClr val="lt1"/>
+            </a:fontRef>
+          </p:style>
+          <p:txBody>
+            <a:bodyPr rtlCol="0" anchor="ctr"/>
+            <a:lstStyle/>
+            <a:p>
+              <a:pPr algn="ctr"/>
+              <a:r>
+                <a:rPr lang="en-US" sz="2000" b="1" dirty="0" smtClean="0">
+                  <a:solidFill>
+                    <a:schemeClr val="tx1"/>
+                  </a:solidFill>
+                  <a:latin typeface="Times New Roman" panose="02020603050405020304" pitchFamily="18" charset="0"/>
+                  <a:cs typeface="Times New Roman" panose="02020603050405020304" pitchFamily="18" charset="0"/>
+                </a:rPr>
+                <a:t>FPGA</a:t>
+              </a:r>
+              <a:endParaRPr lang="en-US" sz="2000" b="1" dirty="0">
+                <a:solidFill>
+                  <a:schemeClr val="tx1"/>
+                </a:solidFill>
+                <a:latin typeface="Times New Roman" panose="02020603050405020304" pitchFamily="18" charset="0"/>
+                <a:cs typeface="Times New Roman" panose="02020603050405020304" pitchFamily="18" charset="0"/>
+              </a:endParaRPr>
+            </a:p>
+          </p:txBody>
+        </p:sp>
+        <p:sp>
+          <p:nvSpPr>
+            <p:cNvPr id="5" name="Rectangle 4"/>
+            <p:cNvSpPr/>
+            <p:nvPr/>
+          </p:nvSpPr>
+          <p:spPr>
+            <a:xfrm>
+              <a:off x="1518698" y="1859458"/>
+              <a:ext cx="1145321" cy="741624"/>
+            </a:xfrm>
+            <a:prstGeom prst="rect">
+              <a:avLst/>
+            </a:prstGeom>
+            <a:solidFill>
+              <a:schemeClr val="accent1">
+                <a:lumMod val="60000"/>
+                <a:lumOff val="40000"/>
+              </a:schemeClr>
+            </a:solidFill>
+            <a:ln w="25400"/>
+          </p:spPr>
+          <p:style>
+            <a:lnRef idx="2">
+              <a:schemeClr val="dk1"/>
+            </a:lnRef>
+            <a:fillRef idx="1">
+              <a:schemeClr val="lt1"/>
+            </a:fillRef>
+            <a:effectRef idx="0">
+              <a:schemeClr val="dk1"/>
+            </a:effectRef>
+            <a:fontRef idx="minor">
+              <a:schemeClr val="dk1"/>
+            </a:fontRef>
+          </p:style>
+          <p:txBody>
+            <a:bodyPr rtlCol="0" anchor="ctr"/>
+            <a:lstStyle/>
+            <a:p>
+              <a:pPr algn="ctr"/>
+              <a:r>
+                <a:rPr lang="en-US" b="1" dirty="0" smtClean="0">
+                  <a:latin typeface="Times New Roman" panose="02020603050405020304" pitchFamily="18" charset="0"/>
+                  <a:cs typeface="Times New Roman" panose="02020603050405020304" pitchFamily="18" charset="0"/>
+                </a:rPr>
+                <a:t>DP</a:t>
+              </a:r>
+            </a:p>
+            <a:p>
+              <a:pPr algn="ctr"/>
+              <a:r>
+                <a:rPr lang="en-US" b="1" dirty="0" smtClean="0">
+                  <a:latin typeface="Times New Roman" panose="02020603050405020304" pitchFamily="18" charset="0"/>
+                  <a:cs typeface="Times New Roman" panose="02020603050405020304" pitchFamily="18" charset="0"/>
+                </a:rPr>
+                <a:t>IQ-MOD</a:t>
+              </a:r>
+            </a:p>
+          </p:txBody>
+        </p:sp>
+        <p:cxnSp>
+          <p:nvCxnSpPr>
+            <p:cNvPr id="7" name="Straight Arrow Connector 6"/>
+            <p:cNvCxnSpPr>
+              <a:endCxn id="5" idx="1"/>
+            </p:cNvCxnSpPr>
+            <p:nvPr/>
+          </p:nvCxnSpPr>
+          <p:spPr>
+            <a:xfrm flipV="1">
+              <a:off x="800937" y="2230271"/>
+              <a:ext cx="717761" cy="1"/>
+            </a:xfrm>
+            <a:prstGeom prst="straightConnector1">
+              <a:avLst/>
+            </a:prstGeom>
+            <a:ln w="28575">
+              <a:solidFill>
+                <a:schemeClr val="tx1"/>
+              </a:solidFill>
+              <a:tailEnd type="triangle"/>
+            </a:ln>
+          </p:spPr>
+          <p:style>
+            <a:lnRef idx="1">
+              <a:schemeClr val="accent1"/>
+            </a:lnRef>
+            <a:fillRef idx="0">
+              <a:schemeClr val="accent1"/>
+            </a:fillRef>
+            <a:effectRef idx="0">
+              <a:schemeClr val="accent1"/>
+            </a:effectRef>
+            <a:fontRef idx="minor">
+              <a:schemeClr val="tx1"/>
+            </a:fontRef>
+          </p:style>
+        </p:cxnSp>
+        <p:sp>
+          <p:nvSpPr>
+            <p:cNvPr id="8" name="Rectangle 7"/>
+            <p:cNvSpPr/>
+            <p:nvPr/>
+          </p:nvSpPr>
+          <p:spPr>
+            <a:xfrm>
+              <a:off x="1713774" y="3043465"/>
+              <a:ext cx="755167" cy="745994"/>
+            </a:xfrm>
+            <a:prstGeom prst="rect">
+              <a:avLst/>
+            </a:prstGeom>
+            <a:solidFill>
+              <a:schemeClr val="accent6">
+                <a:lumMod val="60000"/>
+                <a:lumOff val="40000"/>
+              </a:schemeClr>
+            </a:solidFill>
+            <a:ln w="25400"/>
+          </p:spPr>
+          <p:style>
+            <a:lnRef idx="2">
+              <a:schemeClr val="dk1"/>
+            </a:lnRef>
+            <a:fillRef idx="1">
+              <a:schemeClr val="lt1"/>
+            </a:fillRef>
+            <a:effectRef idx="0">
+              <a:schemeClr val="dk1"/>
+            </a:effectRef>
+            <a:fontRef idx="minor">
+              <a:schemeClr val="dk1"/>
+            </a:fontRef>
+          </p:style>
+          <p:txBody>
+            <a:bodyPr rtlCol="0" anchor="ctr"/>
+            <a:lstStyle/>
+            <a:p>
+              <a:pPr algn="ctr"/>
+              <a:r>
+                <a:rPr lang="en-US" sz="2000" b="1" dirty="0" err="1" smtClean="0">
+                  <a:latin typeface="Times New Roman" panose="02020603050405020304" pitchFamily="18" charset="0"/>
+                  <a:cs typeface="Times New Roman" panose="02020603050405020304" pitchFamily="18" charset="0"/>
+                </a:rPr>
+                <a:t>Tx</a:t>
+              </a:r>
+              <a:endParaRPr lang="en-US" sz="2000" b="1" dirty="0" smtClean="0">
+                <a:latin typeface="Times New Roman" panose="02020603050405020304" pitchFamily="18" charset="0"/>
+                <a:cs typeface="Times New Roman" panose="02020603050405020304" pitchFamily="18" charset="0"/>
+              </a:endParaRPr>
+            </a:p>
+            <a:p>
+              <a:pPr algn="ctr"/>
+              <a:r>
+                <a:rPr lang="en-US" sz="2000" b="1" dirty="0" smtClean="0">
+                  <a:latin typeface="Times New Roman" panose="02020603050405020304" pitchFamily="18" charset="0"/>
+                  <a:cs typeface="Times New Roman" panose="02020603050405020304" pitchFamily="18" charset="0"/>
+                </a:rPr>
+                <a:t>DSP</a:t>
+              </a:r>
+            </a:p>
+          </p:txBody>
+        </p:sp>
+        <p:cxnSp>
+          <p:nvCxnSpPr>
+            <p:cNvPr id="10" name="Straight Arrow Connector 9"/>
+            <p:cNvCxnSpPr>
+              <a:stCxn id="8" idx="0"/>
+              <a:endCxn id="5" idx="2"/>
+            </p:cNvCxnSpPr>
+            <p:nvPr/>
+          </p:nvCxnSpPr>
+          <p:spPr>
+            <a:xfrm flipV="1">
+              <a:off x="2091358" y="2601082"/>
+              <a:ext cx="1" cy="442383"/>
+            </a:xfrm>
+            <a:prstGeom prst="straightConnector1">
+              <a:avLst/>
+            </a:prstGeom>
+            <a:ln w="28575">
+              <a:solidFill>
+                <a:schemeClr val="tx1"/>
+              </a:solidFill>
+              <a:tailEnd type="triangle"/>
+            </a:ln>
+          </p:spPr>
+          <p:style>
+            <a:lnRef idx="1">
+              <a:schemeClr val="accent1"/>
+            </a:lnRef>
+            <a:fillRef idx="0">
+              <a:schemeClr val="accent1"/>
+            </a:fillRef>
+            <a:effectRef idx="0">
+              <a:schemeClr val="accent1"/>
+            </a:effectRef>
+            <a:fontRef idx="minor">
+              <a:schemeClr val="tx1"/>
+            </a:fontRef>
+          </p:style>
+        </p:cxnSp>
+        <p:sp>
+          <p:nvSpPr>
+            <p:cNvPr id="89" name="Rectangle 88"/>
+            <p:cNvSpPr/>
+            <p:nvPr/>
+          </p:nvSpPr>
+          <p:spPr>
+            <a:xfrm>
+              <a:off x="228600" y="1859458"/>
+              <a:ext cx="746740" cy="741624"/>
+            </a:xfrm>
+            <a:prstGeom prst="rect">
+              <a:avLst/>
+            </a:prstGeom>
+            <a:solidFill>
+              <a:schemeClr val="accent2">
+                <a:lumMod val="40000"/>
+                <a:lumOff val="60000"/>
+              </a:schemeClr>
+            </a:solidFill>
+            <a:ln w="28575">
+              <a:solidFill>
+                <a:schemeClr val="tx1"/>
+              </a:solidFill>
+            </a:ln>
+          </p:spPr>
+          <p:style>
+            <a:lnRef idx="2">
+              <a:schemeClr val="dk1"/>
+            </a:lnRef>
+            <a:fillRef idx="1">
+              <a:schemeClr val="lt1"/>
+            </a:fillRef>
+            <a:effectRef idx="0">
+              <a:schemeClr val="dk1"/>
+            </a:effectRef>
+            <a:fontRef idx="minor">
+              <a:schemeClr val="dk1"/>
+            </a:fontRef>
+          </p:style>
+          <p:txBody>
+            <a:bodyPr rtlCol="0" anchor="ctr"/>
+            <a:lstStyle/>
+            <a:p>
+              <a:pPr algn="ctr"/>
+              <a:r>
+                <a:rPr lang="en-US" sz="1600" b="1" dirty="0" smtClean="0">
+                  <a:latin typeface="Times New Roman" panose="02020603050405020304" pitchFamily="18" charset="0"/>
+                  <a:cs typeface="Times New Roman" panose="02020603050405020304" pitchFamily="18" charset="0"/>
+                </a:rPr>
+                <a:t>DFB</a:t>
+              </a:r>
+            </a:p>
+            <a:p>
+              <a:pPr algn="ctr"/>
+              <a:r>
+                <a:rPr lang="en-US" sz="1600" b="1" dirty="0" smtClean="0">
+                  <a:latin typeface="Times New Roman" panose="02020603050405020304" pitchFamily="18" charset="0"/>
+                  <a:cs typeface="Times New Roman" panose="02020603050405020304" pitchFamily="18" charset="0"/>
+                </a:rPr>
+                <a:t>Or</a:t>
+              </a:r>
+            </a:p>
+            <a:p>
+              <a:pPr algn="ctr"/>
+              <a:r>
+                <a:rPr lang="en-US" sz="1600" b="1" dirty="0" smtClean="0">
+                  <a:latin typeface="Times New Roman" panose="02020603050405020304" pitchFamily="18" charset="0"/>
+                  <a:cs typeface="Times New Roman" panose="02020603050405020304" pitchFamily="18" charset="0"/>
+                </a:rPr>
+                <a:t>ECL</a:t>
+              </a:r>
+              <a:endParaRPr lang="en-US" sz="1600" b="1" dirty="0">
+                <a:latin typeface="Times New Roman" panose="02020603050405020304" pitchFamily="18" charset="0"/>
+                <a:cs typeface="Times New Roman" panose="02020603050405020304" pitchFamily="18" charset="0"/>
+              </a:endParaRPr>
+            </a:p>
+          </p:txBody>
+        </p:sp>
+        <p:cxnSp>
+          <p:nvCxnSpPr>
+            <p:cNvPr id="118" name="Straight Arrow Connector 117"/>
+            <p:cNvCxnSpPr>
+              <a:stCxn id="5" idx="3"/>
+              <a:endCxn id="14" idx="1"/>
+            </p:cNvCxnSpPr>
+            <p:nvPr/>
+          </p:nvCxnSpPr>
+          <p:spPr>
+            <a:xfrm flipV="1">
+              <a:off x="2664019" y="2225241"/>
+              <a:ext cx="1877557" cy="5029"/>
+            </a:xfrm>
+            <a:prstGeom prst="straightConnector1">
+              <a:avLst/>
+            </a:prstGeom>
+            <a:ln w="28575">
+              <a:solidFill>
+                <a:schemeClr val="tx1"/>
+              </a:solidFill>
+              <a:tailEnd type="triangle"/>
+            </a:ln>
+          </p:spPr>
+          <p:style>
+            <a:lnRef idx="1">
+              <a:schemeClr val="accent1"/>
+            </a:lnRef>
+            <a:fillRef idx="0">
+              <a:schemeClr val="accent1"/>
+            </a:fillRef>
+            <a:effectRef idx="0">
+              <a:schemeClr val="accent1"/>
+            </a:effectRef>
+            <a:fontRef idx="minor">
+              <a:schemeClr val="tx1"/>
+            </a:fontRef>
+          </p:style>
+        </p:cxnSp>
+        <p:grpSp>
+          <p:nvGrpSpPr>
+            <p:cNvPr id="77" name="Group 76"/>
+            <p:cNvGrpSpPr/>
+            <p:nvPr/>
+          </p:nvGrpSpPr>
+          <p:grpSpPr>
+            <a:xfrm>
+              <a:off x="3261369" y="1667432"/>
+              <a:ext cx="627842" cy="557809"/>
+              <a:chOff x="3643771" y="1681220"/>
+              <a:chExt cx="627842" cy="557809"/>
+            </a:xfrm>
+          </p:grpSpPr>
+          <p:sp>
+            <p:nvSpPr>
+              <p:cNvPr id="121" name="Oval 120"/>
+              <p:cNvSpPr/>
+              <p:nvPr/>
+            </p:nvSpPr>
+            <p:spPr>
+              <a:xfrm>
+                <a:off x="3643771" y="1681220"/>
+                <a:ext cx="313921" cy="557809"/>
+              </a:xfrm>
+              <a:prstGeom prst="ellipse">
+                <a:avLst/>
+              </a:prstGeom>
+              <a:ln w="28575"/>
+            </p:spPr>
+            <p:style>
+              <a:lnRef idx="2">
+                <a:schemeClr val="dk1"/>
+              </a:lnRef>
+              <a:fillRef idx="1">
+                <a:schemeClr val="lt1"/>
+              </a:fillRef>
+              <a:effectRef idx="0">
+                <a:schemeClr val="dk1"/>
+              </a:effectRef>
+              <a:fontRef idx="minor">
+                <a:schemeClr val="dk1"/>
+              </a:fontRef>
+            </p:style>
+            <p:txBody>
+              <a:bodyPr rtlCol="0" anchor="ctr"/>
+              <a:lstStyle/>
+              <a:p>
+                <a:pPr algn="ctr"/>
+                <a:endParaRPr lang="en-US"/>
+              </a:p>
+            </p:txBody>
+          </p:sp>
+          <p:sp>
+            <p:nvSpPr>
+              <p:cNvPr id="122" name="Oval 121"/>
+              <p:cNvSpPr/>
+              <p:nvPr/>
+            </p:nvSpPr>
+            <p:spPr>
+              <a:xfrm>
+                <a:off x="3800732" y="1681220"/>
+                <a:ext cx="313921" cy="557809"/>
+              </a:xfrm>
+              <a:prstGeom prst="ellipse">
+                <a:avLst/>
+              </a:prstGeom>
+              <a:ln w="28575"/>
+            </p:spPr>
+            <p:style>
+              <a:lnRef idx="2">
+                <a:schemeClr val="dk1"/>
+              </a:lnRef>
+              <a:fillRef idx="1">
+                <a:schemeClr val="lt1"/>
+              </a:fillRef>
+              <a:effectRef idx="0">
+                <a:schemeClr val="dk1"/>
+              </a:effectRef>
+              <a:fontRef idx="minor">
+                <a:schemeClr val="dk1"/>
+              </a:fontRef>
+            </p:style>
+            <p:txBody>
+              <a:bodyPr rtlCol="0" anchor="ctr"/>
+              <a:lstStyle/>
+              <a:p>
+                <a:pPr algn="ctr"/>
+                <a:endParaRPr lang="en-US"/>
+              </a:p>
+            </p:txBody>
+          </p:sp>
+          <p:sp>
+            <p:nvSpPr>
+              <p:cNvPr id="123" name="Oval 122"/>
+              <p:cNvSpPr/>
+              <p:nvPr/>
+            </p:nvSpPr>
+            <p:spPr>
+              <a:xfrm>
+                <a:off x="3957692" y="1681220"/>
+                <a:ext cx="313921" cy="557809"/>
+              </a:xfrm>
+              <a:prstGeom prst="ellipse">
+                <a:avLst/>
+              </a:prstGeom>
+              <a:ln w="28575"/>
+            </p:spPr>
+            <p:style>
+              <a:lnRef idx="2">
+                <a:schemeClr val="dk1"/>
+              </a:lnRef>
+              <a:fillRef idx="1">
+                <a:schemeClr val="lt1"/>
+              </a:fillRef>
+              <a:effectRef idx="0">
+                <a:schemeClr val="dk1"/>
+              </a:effectRef>
+              <a:fontRef idx="minor">
+                <a:schemeClr val="dk1"/>
+              </a:fontRef>
+            </p:style>
+            <p:txBody>
+              <a:bodyPr rtlCol="0" anchor="ctr"/>
+              <a:lstStyle/>
+              <a:p>
+                <a:pPr algn="ctr"/>
+                <a:endParaRPr lang="en-US"/>
+              </a:p>
+            </p:txBody>
+          </p:sp>
+        </p:grpSp>
+        <p:cxnSp>
+          <p:nvCxnSpPr>
+            <p:cNvPr id="71" name="Straight Arrow Connector 70"/>
+            <p:cNvCxnSpPr>
+              <a:stCxn id="108" idx="3"/>
+              <a:endCxn id="25" idx="1"/>
+            </p:cNvCxnSpPr>
+            <p:nvPr/>
+          </p:nvCxnSpPr>
+          <p:spPr>
+            <a:xfrm>
+              <a:off x="3885415" y="3410290"/>
+              <a:ext cx="653178" cy="0"/>
+            </a:xfrm>
+            <a:prstGeom prst="straightConnector1">
+              <a:avLst/>
+            </a:prstGeom>
+            <a:ln w="28575">
+              <a:solidFill>
+                <a:schemeClr val="tx1"/>
+              </a:solidFill>
+              <a:tailEnd type="triangle"/>
+            </a:ln>
+          </p:spPr>
+          <p:style>
+            <a:lnRef idx="1">
+              <a:schemeClr val="accent1"/>
+            </a:lnRef>
+            <a:fillRef idx="0">
+              <a:schemeClr val="accent1"/>
+            </a:fillRef>
+            <a:effectRef idx="0">
+              <a:schemeClr val="accent1"/>
+            </a:effectRef>
+            <a:fontRef idx="minor">
+              <a:schemeClr val="tx1"/>
+            </a:fontRef>
+          </p:style>
+        </p:cxnSp>
         <p:sp>
           <p:nvSpPr>
             <p:cNvPr id="94" name="Rectangle 93"/>
@@ -3035,8 +3742,8 @@
           </p:nvSpPr>
           <p:spPr>
             <a:xfrm>
-              <a:off x="5062475" y="1400176"/>
-              <a:ext cx="4811583" cy="3333749"/>
+              <a:off x="4227309" y="1400175"/>
+              <a:ext cx="4839780" cy="3333749"/>
             </a:xfrm>
             <a:prstGeom prst="rect">
               <a:avLst/>
@@ -3076,34 +3783,220 @@
             </a:p>
           </p:txBody>
         </p:sp>
+        <p:sp>
+          <p:nvSpPr>
+            <p:cNvPr id="11" name="Rectangle 10"/>
+            <p:cNvSpPr/>
+            <p:nvPr/>
+          </p:nvSpPr>
+          <p:spPr>
+            <a:xfrm>
+              <a:off x="5704508" y="2042580"/>
+              <a:ext cx="1138801" cy="850445"/>
+            </a:xfrm>
+            <a:prstGeom prst="rect">
+              <a:avLst/>
+            </a:prstGeom>
+            <a:solidFill>
+              <a:schemeClr val="accent4">
+                <a:lumMod val="60000"/>
+                <a:lumOff val="40000"/>
+              </a:schemeClr>
+            </a:solidFill>
+            <a:ln w="28575">
+              <a:solidFill>
+                <a:schemeClr val="tx1"/>
+              </a:solidFill>
+            </a:ln>
+          </p:spPr>
+          <p:style>
+            <a:lnRef idx="2">
+              <a:schemeClr val="dk1"/>
+            </a:lnRef>
+            <a:fillRef idx="1">
+              <a:schemeClr val="lt1"/>
+            </a:fillRef>
+            <a:effectRef idx="0">
+              <a:schemeClr val="dk1"/>
+            </a:effectRef>
+            <a:fontRef idx="minor">
+              <a:schemeClr val="dk1"/>
+            </a:fontRef>
+          </p:style>
+          <p:txBody>
+            <a:bodyPr rtlCol="0" anchor="ctr"/>
+            <a:lstStyle/>
+            <a:p>
+              <a:pPr algn="ctr"/>
+              <a:r>
+                <a:rPr lang="en-US" sz="2000" b="1" dirty="0" smtClean="0">
+                  <a:latin typeface="Times New Roman" panose="02020603050405020304" pitchFamily="18" charset="0"/>
+                  <a:cs typeface="Times New Roman" panose="02020603050405020304" pitchFamily="18" charset="0"/>
+                </a:rPr>
+                <a:t>2x2</a:t>
+              </a:r>
+            </a:p>
+            <a:p>
+              <a:pPr algn="ctr"/>
+              <a:r>
+                <a:rPr lang="en-US" sz="2000" b="1" dirty="0" smtClean="0">
+                  <a:latin typeface="Times New Roman" panose="02020603050405020304" pitchFamily="18" charset="0"/>
+                  <a:cs typeface="Times New Roman" panose="02020603050405020304" pitchFamily="18" charset="0"/>
+                </a:rPr>
+                <a:t>Coupler</a:t>
+              </a:r>
+            </a:p>
+          </p:txBody>
+        </p:sp>
+        <p:cxnSp>
+          <p:nvCxnSpPr>
+            <p:cNvPr id="16" name="Straight Arrow Connector 15"/>
+            <p:cNvCxnSpPr/>
+            <p:nvPr/>
+          </p:nvCxnSpPr>
+          <p:spPr>
+            <a:xfrm>
+              <a:off x="4905016" y="2218846"/>
+              <a:ext cx="777407" cy="3322"/>
+            </a:xfrm>
+            <a:prstGeom prst="straightConnector1">
+              <a:avLst/>
+            </a:prstGeom>
+            <a:ln w="28575">
+              <a:solidFill>
+                <a:srgbClr val="00B0F0"/>
+              </a:solidFill>
+              <a:tailEnd type="triangle"/>
+            </a:ln>
+          </p:spPr>
+          <p:style>
+            <a:lnRef idx="1">
+              <a:schemeClr val="accent1"/>
+            </a:lnRef>
+            <a:fillRef idx="0">
+              <a:schemeClr val="accent1"/>
+            </a:fillRef>
+            <a:effectRef idx="0">
+              <a:schemeClr val="accent1"/>
+            </a:effectRef>
+            <a:fontRef idx="minor">
+              <a:schemeClr val="tx1"/>
+            </a:fontRef>
+          </p:style>
+        </p:cxnSp>
+        <p:sp>
+          <p:nvSpPr>
+            <p:cNvPr id="14" name="Rectangle 13"/>
+            <p:cNvSpPr/>
+            <p:nvPr/>
+          </p:nvSpPr>
+          <p:spPr>
+            <a:xfrm>
+              <a:off x="4541576" y="2045651"/>
+              <a:ext cx="354486" cy="359179"/>
+            </a:xfrm>
+            <a:prstGeom prst="rect">
+              <a:avLst/>
+            </a:prstGeom>
+            <a:solidFill>
+              <a:srgbClr val="FF0000"/>
+            </a:solidFill>
+            <a:ln w="28575">
+              <a:solidFill>
+                <a:schemeClr val="tx1"/>
+              </a:solidFill>
+            </a:ln>
+          </p:spPr>
+          <p:style>
+            <a:lnRef idx="2">
+              <a:schemeClr val="dk1"/>
+            </a:lnRef>
+            <a:fillRef idx="1">
+              <a:schemeClr val="lt1"/>
+            </a:fillRef>
+            <a:effectRef idx="0">
+              <a:schemeClr val="dk1"/>
+            </a:effectRef>
+            <a:fontRef idx="minor">
+              <a:schemeClr val="dk1"/>
+            </a:fontRef>
+          </p:style>
+          <p:txBody>
+            <a:bodyPr rtlCol="0" anchor="ctr"/>
+            <a:lstStyle/>
+            <a:p>
+              <a:pPr algn="ctr"/>
+              <a:endParaRPr lang="en-US"/>
+            </a:p>
+          </p:txBody>
+        </p:sp>
+        <p:cxnSp>
+          <p:nvCxnSpPr>
+            <p:cNvPr id="22" name="Straight Connector 21"/>
+            <p:cNvCxnSpPr/>
+            <p:nvPr/>
+          </p:nvCxnSpPr>
+          <p:spPr>
+            <a:xfrm>
+              <a:off x="4546053" y="2050289"/>
+              <a:ext cx="354486" cy="359178"/>
+            </a:xfrm>
+            <a:prstGeom prst="line">
+              <a:avLst/>
+            </a:prstGeom>
+            <a:ln w="28575">
+              <a:solidFill>
+                <a:schemeClr val="tx1"/>
+              </a:solidFill>
+            </a:ln>
+          </p:spPr>
+          <p:style>
+            <a:lnRef idx="1">
+              <a:schemeClr val="dk1"/>
+            </a:lnRef>
+            <a:fillRef idx="0">
+              <a:schemeClr val="dk1"/>
+            </a:fillRef>
+            <a:effectRef idx="0">
+              <a:schemeClr val="dk1"/>
+            </a:effectRef>
+            <a:fontRef idx="minor">
+              <a:schemeClr val="tx1"/>
+            </a:fontRef>
+          </p:style>
+        </p:cxnSp>
         <p:grpSp>
           <p:nvGrpSpPr>
-            <p:cNvPr id="91" name="Group 90"/>
+            <p:cNvPr id="3" name="Group 2"/>
             <p:cNvGrpSpPr/>
             <p:nvPr/>
           </p:nvGrpSpPr>
           <p:grpSpPr>
             <a:xfrm>
-              <a:off x="4030082" y="1878810"/>
-              <a:ext cx="7325095" cy="2391669"/>
-              <a:chOff x="3744311" y="638620"/>
-              <a:chExt cx="6066823" cy="1810835"/>
+              <a:off x="4538592" y="3230700"/>
+              <a:ext cx="354487" cy="364615"/>
+              <a:chOff x="5294928" y="3252986"/>
+              <a:chExt cx="356517" cy="364615"/>
             </a:xfrm>
+            <a:solidFill>
+              <a:srgbClr val="FF0000"/>
+            </a:solidFill>
           </p:grpSpPr>
           <p:sp>
             <p:nvSpPr>
-              <p:cNvPr id="11" name="Rectangle 10"/>
+              <p:cNvPr id="25" name="Rectangle 24"/>
               <p:cNvSpPr/>
               <p:nvPr/>
             </p:nvSpPr>
             <p:spPr>
               <a:xfrm>
-                <a:off x="5658115" y="762618"/>
-                <a:ext cx="948583" cy="643908"/>
+                <a:off x="5294929" y="3252986"/>
+                <a:ext cx="356516" cy="359179"/>
               </a:xfrm>
               <a:prstGeom prst="rect">
                 <a:avLst/>
               </a:prstGeom>
+              <a:grpFill/>
               <a:ln w="28575">
                 <a:solidFill>
                   <a:schemeClr val="tx1"/>
@@ -3129,340 +4022,25 @@
               <a:lstStyle/>
               <a:p>
                 <a:pPr algn="ctr"/>
-                <a:r>
-                  <a:rPr lang="en-US" sz="2000" b="1" dirty="0" smtClean="0">
-                    <a:latin typeface="Times New Roman" panose="02020603050405020304" pitchFamily="18" charset="0"/>
-                    <a:cs typeface="Times New Roman" panose="02020603050405020304" pitchFamily="18" charset="0"/>
-                  </a:rPr>
-                  <a:t>2x2</a:t>
-                </a:r>
-              </a:p>
-              <a:p>
-                <a:pPr algn="ctr"/>
-                <a:r>
-                  <a:rPr lang="en-US" sz="2000" b="1" dirty="0" smtClean="0">
-                    <a:latin typeface="Times New Roman" panose="02020603050405020304" pitchFamily="18" charset="0"/>
-                    <a:cs typeface="Times New Roman" panose="02020603050405020304" pitchFamily="18" charset="0"/>
-                  </a:rPr>
-                  <a:t>Coupler</a:t>
-                </a:r>
+                <a:endParaRPr lang="en-US"/>
               </a:p>
             </p:txBody>
           </p:sp>
           <p:cxnSp>
             <p:nvCxnSpPr>
-              <p:cNvPr id="16" name="Straight Arrow Connector 15"/>
+              <p:cNvPr id="26" name="Straight Connector 25"/>
               <p:cNvCxnSpPr/>
               <p:nvPr/>
             </p:nvCxnSpPr>
             <p:spPr>
-              <a:xfrm flipV="1">
-                <a:off x="5092558" y="898592"/>
-                <a:ext cx="558100" cy="1448"/>
+              <a:xfrm>
+                <a:off x="5294928" y="3258423"/>
+                <a:ext cx="356516" cy="359178"/>
               </a:xfrm>
-              <a:prstGeom prst="straightConnector1">
+              <a:prstGeom prst="line">
                 <a:avLst/>
               </a:prstGeom>
-              <a:ln w="28575">
-                <a:solidFill>
-                  <a:schemeClr val="tx1"/>
-                </a:solidFill>
-                <a:tailEnd type="triangle"/>
-              </a:ln>
-            </p:spPr>
-            <p:style>
-              <a:lnRef idx="1">
-                <a:schemeClr val="accent1"/>
-              </a:lnRef>
-              <a:fillRef idx="0">
-                <a:schemeClr val="accent1"/>
-              </a:fillRef>
-              <a:effectRef idx="0">
-                <a:schemeClr val="accent1"/>
-              </a:effectRef>
-              <a:fontRef idx="minor">
-                <a:schemeClr val="tx1"/>
-              </a:fontRef>
-            </p:style>
-          </p:cxnSp>
-          <p:grpSp>
-            <p:nvGrpSpPr>
-              <p:cNvPr id="23" name="Group 22"/>
-              <p:cNvGrpSpPr/>
-              <p:nvPr/>
-            </p:nvGrpSpPr>
-            <p:grpSpPr>
-              <a:xfrm>
-                <a:off x="4793554" y="762617"/>
-                <a:ext cx="295275" cy="271950"/>
-                <a:chOff x="4819650" y="953611"/>
-                <a:chExt cx="295275" cy="271950"/>
-              </a:xfrm>
-            </p:grpSpPr>
-            <p:sp>
-              <p:nvSpPr>
-                <p:cNvPr id="14" name="Rectangle 13"/>
-                <p:cNvSpPr/>
-                <p:nvPr/>
-              </p:nvSpPr>
-              <p:spPr>
-                <a:xfrm>
-                  <a:off x="4819650" y="953611"/>
-                  <a:ext cx="295275" cy="271950"/>
-                </a:xfrm>
-                <a:prstGeom prst="rect">
-                  <a:avLst/>
-                </a:prstGeom>
-                <a:ln w="28575">
-                  <a:solidFill>
-                    <a:schemeClr val="tx1"/>
-                  </a:solidFill>
-                </a:ln>
-              </p:spPr>
-              <p:style>
-                <a:lnRef idx="2">
-                  <a:schemeClr val="dk1"/>
-                </a:lnRef>
-                <a:fillRef idx="1">
-                  <a:schemeClr val="lt1"/>
-                </a:fillRef>
-                <a:effectRef idx="0">
-                  <a:schemeClr val="dk1"/>
-                </a:effectRef>
-                <a:fontRef idx="minor">
-                  <a:schemeClr val="dk1"/>
-                </a:fontRef>
-              </p:style>
-              <p:txBody>
-                <a:bodyPr rtlCol="0" anchor="ctr"/>
-                <a:lstStyle/>
-                <a:p>
-                  <a:pPr algn="ctr"/>
-                  <a:endParaRPr lang="en-US"/>
-                </a:p>
-              </p:txBody>
-            </p:sp>
-            <p:cxnSp>
-              <p:nvCxnSpPr>
-                <p:cNvPr id="22" name="Straight Connector 21"/>
-                <p:cNvCxnSpPr/>
-                <p:nvPr/>
-              </p:nvCxnSpPr>
-              <p:spPr>
-                <a:xfrm>
-                  <a:off x="4819650" y="953611"/>
-                  <a:ext cx="295275" cy="271949"/>
-                </a:xfrm>
-                <a:prstGeom prst="line">
-                  <a:avLst/>
-                </a:prstGeom>
-                <a:ln w="28575">
-                  <a:solidFill>
-                    <a:schemeClr val="tx1"/>
-                  </a:solidFill>
-                </a:ln>
-              </p:spPr>
-              <p:style>
-                <a:lnRef idx="1">
-                  <a:schemeClr val="dk1"/>
-                </a:lnRef>
-                <a:fillRef idx="0">
-                  <a:schemeClr val="dk1"/>
-                </a:fillRef>
-                <a:effectRef idx="0">
-                  <a:schemeClr val="dk1"/>
-                </a:effectRef>
-                <a:fontRef idx="minor">
-                  <a:schemeClr val="tx1"/>
-                </a:fontRef>
-              </p:style>
-            </p:cxnSp>
-          </p:grpSp>
-          <p:grpSp>
-            <p:nvGrpSpPr>
-              <p:cNvPr id="24" name="Group 23"/>
-              <p:cNvGrpSpPr/>
-              <p:nvPr/>
-            </p:nvGrpSpPr>
-            <p:grpSpPr>
-              <a:xfrm>
-                <a:off x="4819650" y="2035743"/>
-                <a:ext cx="295275" cy="271950"/>
-                <a:chOff x="4819650" y="953611"/>
-                <a:chExt cx="295275" cy="271950"/>
-              </a:xfrm>
-            </p:grpSpPr>
-            <p:sp>
-              <p:nvSpPr>
-                <p:cNvPr id="25" name="Rectangle 24"/>
-                <p:cNvSpPr/>
-                <p:nvPr/>
-              </p:nvSpPr>
-              <p:spPr>
-                <a:xfrm>
-                  <a:off x="4819650" y="953611"/>
-                  <a:ext cx="295275" cy="271950"/>
-                </a:xfrm>
-                <a:prstGeom prst="rect">
-                  <a:avLst/>
-                </a:prstGeom>
-                <a:ln w="28575">
-                  <a:solidFill>
-                    <a:schemeClr val="tx1"/>
-                  </a:solidFill>
-                </a:ln>
-              </p:spPr>
-              <p:style>
-                <a:lnRef idx="2">
-                  <a:schemeClr val="dk1"/>
-                </a:lnRef>
-                <a:fillRef idx="1">
-                  <a:schemeClr val="lt1"/>
-                </a:fillRef>
-                <a:effectRef idx="0">
-                  <a:schemeClr val="dk1"/>
-                </a:effectRef>
-                <a:fontRef idx="minor">
-                  <a:schemeClr val="dk1"/>
-                </a:fontRef>
-              </p:style>
-              <p:txBody>
-                <a:bodyPr rtlCol="0" anchor="ctr"/>
-                <a:lstStyle/>
-                <a:p>
-                  <a:pPr algn="ctr"/>
-                  <a:endParaRPr lang="en-US"/>
-                </a:p>
-              </p:txBody>
-            </p:sp>
-            <p:cxnSp>
-              <p:nvCxnSpPr>
-                <p:cNvPr id="26" name="Straight Connector 25"/>
-                <p:cNvCxnSpPr/>
-                <p:nvPr/>
-              </p:nvCxnSpPr>
-              <p:spPr>
-                <a:xfrm>
-                  <a:off x="4819650" y="953611"/>
-                  <a:ext cx="295275" cy="271949"/>
-                </a:xfrm>
-                <a:prstGeom prst="line">
-                  <a:avLst/>
-                </a:prstGeom>
-                <a:ln w="28575">
-                  <a:solidFill>
-                    <a:schemeClr val="tx1"/>
-                  </a:solidFill>
-                </a:ln>
-              </p:spPr>
-              <p:style>
-                <a:lnRef idx="1">
-                  <a:schemeClr val="dk1"/>
-                </a:lnRef>
-                <a:fillRef idx="0">
-                  <a:schemeClr val="dk1"/>
-                </a:fillRef>
-                <a:effectRef idx="0">
-                  <a:schemeClr val="dk1"/>
-                </a:effectRef>
-                <a:fontRef idx="minor">
-                  <a:schemeClr val="tx1"/>
-                </a:fontRef>
-              </p:style>
-            </p:cxnSp>
-          </p:grpSp>
-          <p:cxnSp>
-            <p:nvCxnSpPr>
-              <p:cNvPr id="28" name="Straight Arrow Connector 27"/>
-              <p:cNvCxnSpPr/>
-              <p:nvPr/>
-            </p:nvCxnSpPr>
-            <p:spPr>
-              <a:xfrm flipV="1">
-                <a:off x="5114925" y="2171718"/>
-                <a:ext cx="543189" cy="1"/>
-              </a:xfrm>
-              <a:prstGeom prst="straightConnector1">
-                <a:avLst/>
-              </a:prstGeom>
-              <a:ln w="28575">
-                <a:solidFill>
-                  <a:schemeClr val="tx1"/>
-                </a:solidFill>
-                <a:tailEnd type="triangle"/>
-              </a:ln>
-            </p:spPr>
-            <p:style>
-              <a:lnRef idx="1">
-                <a:schemeClr val="accent1"/>
-              </a:lnRef>
-              <a:fillRef idx="0">
-                <a:schemeClr val="accent1"/>
-              </a:fillRef>
-              <a:effectRef idx="0">
-                <a:schemeClr val="accent1"/>
-              </a:effectRef>
-              <a:fontRef idx="minor">
-                <a:schemeClr val="tx1"/>
-              </a:fontRef>
-            </p:style>
-          </p:cxnSp>
-          <p:cxnSp>
-            <p:nvCxnSpPr>
-              <p:cNvPr id="34" name="Elbow Connector 33"/>
-              <p:cNvCxnSpPr>
-                <a:stCxn id="25" idx="0"/>
-              </p:cNvCxnSpPr>
-              <p:nvPr/>
-            </p:nvCxnSpPr>
-            <p:spPr>
-              <a:xfrm rot="5400000" flipH="1" flipV="1">
-                <a:off x="4936792" y="1321875"/>
-                <a:ext cx="744365" cy="683372"/>
-              </a:xfrm>
-              <a:prstGeom prst="bentConnector3">
-                <a:avLst>
-                  <a:gd name="adj1" fmla="val 99905"/>
-                </a:avLst>
-              </a:prstGeom>
-              <a:ln w="28575">
-                <a:solidFill>
-                  <a:schemeClr val="tx1"/>
-                </a:solidFill>
-                <a:tailEnd type="triangle"/>
-              </a:ln>
-            </p:spPr>
-            <p:style>
-              <a:lnRef idx="1">
-                <a:schemeClr val="accent1"/>
-              </a:lnRef>
-              <a:fillRef idx="0">
-                <a:schemeClr val="accent1"/>
-              </a:fillRef>
-              <a:effectRef idx="0">
-                <a:schemeClr val="accent1"/>
-              </a:effectRef>
-              <a:fontRef idx="minor">
-                <a:schemeClr val="tx1"/>
-              </a:fontRef>
-            </p:style>
-          </p:cxnSp>
-          <p:cxnSp>
-            <p:nvCxnSpPr>
-              <p:cNvPr id="41" name="Elbow Connector 40"/>
-              <p:cNvCxnSpPr>
-                <a:stCxn id="14" idx="2"/>
-              </p:cNvCxnSpPr>
-              <p:nvPr/>
-            </p:nvCxnSpPr>
-            <p:spPr>
-              <a:xfrm rot="16200000" flipH="1">
-                <a:off x="5073263" y="902495"/>
-                <a:ext cx="126694" cy="390837"/>
-              </a:xfrm>
-              <a:prstGeom prst="bentConnector2">
-                <a:avLst/>
-              </a:prstGeom>
+              <a:grpFill/>
               <a:ln w="28575">
                 <a:solidFill>
                   <a:schemeClr val="tx1"/>
@@ -3471,603 +4049,13 @@
             </p:spPr>
             <p:style>
               <a:lnRef idx="1">
-                <a:schemeClr val="accent1"/>
+                <a:schemeClr val="dk1"/>
               </a:lnRef>
               <a:fillRef idx="0">
-                <a:schemeClr val="accent1"/>
-              </a:fillRef>
-              <a:effectRef idx="0">
-                <a:schemeClr val="accent1"/>
-              </a:effectRef>
-              <a:fontRef idx="minor">
-                <a:schemeClr val="tx1"/>
-              </a:fontRef>
-            </p:style>
-          </p:cxnSp>
-          <p:cxnSp>
-            <p:nvCxnSpPr>
-              <p:cNvPr id="43" name="Elbow Connector 42"/>
-              <p:cNvCxnSpPr/>
-              <p:nvPr/>
-            </p:nvCxnSpPr>
-            <p:spPr>
-              <a:xfrm rot="16200000" flipH="1">
-                <a:off x="5175591" y="1317703"/>
-                <a:ext cx="638965" cy="326084"/>
-              </a:xfrm>
-              <a:prstGeom prst="bentConnector3">
-                <a:avLst>
-                  <a:gd name="adj1" fmla="val 100311"/>
-                </a:avLst>
-              </a:prstGeom>
-              <a:ln w="28575">
-                <a:solidFill>
-                  <a:schemeClr val="tx1"/>
-                </a:solidFill>
-                <a:tailEnd type="triangle"/>
-              </a:ln>
-            </p:spPr>
-            <p:style>
-              <a:lnRef idx="1">
-                <a:schemeClr val="accent1"/>
-              </a:lnRef>
-              <a:fillRef idx="0">
-                <a:schemeClr val="accent1"/>
-              </a:fillRef>
-              <a:effectRef idx="0">
-                <a:schemeClr val="accent1"/>
-              </a:effectRef>
-              <a:fontRef idx="minor">
-                <a:schemeClr val="tx1"/>
-              </a:fontRef>
-            </p:style>
-          </p:cxnSp>
-          <p:sp>
-            <p:nvSpPr>
-              <p:cNvPr id="59" name="Rectangle 58"/>
-              <p:cNvSpPr/>
-              <p:nvPr/>
-            </p:nvSpPr>
-            <p:spPr>
-              <a:xfrm>
-                <a:off x="5658115" y="1666820"/>
-                <a:ext cx="948583" cy="643908"/>
-              </a:xfrm>
-              <a:prstGeom prst="rect">
-                <a:avLst/>
-              </a:prstGeom>
-              <a:ln w="28575">
-                <a:solidFill>
-                  <a:schemeClr val="tx1"/>
-                </a:solidFill>
-              </a:ln>
-            </p:spPr>
-            <p:style>
-              <a:lnRef idx="2">
                 <a:schemeClr val="dk1"/>
-              </a:lnRef>
-              <a:fillRef idx="1">
-                <a:schemeClr val="lt1"/>
               </a:fillRef>
               <a:effectRef idx="0">
                 <a:schemeClr val="dk1"/>
-              </a:effectRef>
-              <a:fontRef idx="minor">
-                <a:schemeClr val="dk1"/>
-              </a:fontRef>
-            </p:style>
-            <p:txBody>
-              <a:bodyPr rtlCol="0" anchor="ctr"/>
-              <a:lstStyle/>
-              <a:p>
-                <a:pPr algn="ctr"/>
-                <a:r>
-                  <a:rPr lang="en-US" sz="2000" b="1" dirty="0">
-                    <a:latin typeface="Times New Roman" panose="02020603050405020304" pitchFamily="18" charset="0"/>
-                    <a:cs typeface="Times New Roman" panose="02020603050405020304" pitchFamily="18" charset="0"/>
-                  </a:rPr>
-                  <a:t>2x2</a:t>
-                </a:r>
-              </a:p>
-              <a:p>
-                <a:pPr algn="ctr"/>
-                <a:r>
-                  <a:rPr lang="en-US" sz="2000" b="1" dirty="0">
-                    <a:latin typeface="Times New Roman" panose="02020603050405020304" pitchFamily="18" charset="0"/>
-                    <a:cs typeface="Times New Roman" panose="02020603050405020304" pitchFamily="18" charset="0"/>
-                  </a:rPr>
-                  <a:t>Coupler</a:t>
-                </a:r>
-              </a:p>
-            </p:txBody>
-          </p:sp>
-          <p:sp>
-            <p:nvSpPr>
-              <p:cNvPr id="61" name="Rectangle 60"/>
-              <p:cNvSpPr/>
-              <p:nvPr/>
-            </p:nvSpPr>
-            <p:spPr>
-              <a:xfrm>
-                <a:off x="3744311" y="1893978"/>
-                <a:ext cx="618468" cy="555477"/>
-              </a:xfrm>
-              <a:prstGeom prst="rect">
-                <a:avLst/>
-              </a:prstGeom>
-              <a:ln w="28575">
-                <a:solidFill>
-                  <a:schemeClr val="tx1"/>
-                </a:solidFill>
-              </a:ln>
-            </p:spPr>
-            <p:style>
-              <a:lnRef idx="2">
-                <a:schemeClr val="dk1"/>
-              </a:lnRef>
-              <a:fillRef idx="1">
-                <a:schemeClr val="lt1"/>
-              </a:fillRef>
-              <a:effectRef idx="0">
-                <a:schemeClr val="dk1"/>
-              </a:effectRef>
-              <a:fontRef idx="minor">
-                <a:schemeClr val="dk1"/>
-              </a:fontRef>
-            </p:style>
-            <p:txBody>
-              <a:bodyPr rtlCol="0" anchor="ctr"/>
-              <a:lstStyle/>
-              <a:p>
-                <a:pPr algn="ctr"/>
-                <a:r>
-                  <a:rPr lang="en-US" sz="1600" b="1" dirty="0" smtClean="0">
-                    <a:latin typeface="Times New Roman" panose="02020603050405020304" pitchFamily="18" charset="0"/>
-                    <a:cs typeface="Times New Roman" panose="02020603050405020304" pitchFamily="18" charset="0"/>
-                  </a:rPr>
-                  <a:t>DFB</a:t>
-                </a:r>
-              </a:p>
-              <a:p>
-                <a:pPr algn="ctr"/>
-                <a:r>
-                  <a:rPr lang="en-US" sz="1600" b="1" dirty="0" smtClean="0">
-                    <a:latin typeface="Times New Roman" panose="02020603050405020304" pitchFamily="18" charset="0"/>
-                    <a:cs typeface="Times New Roman" panose="02020603050405020304" pitchFamily="18" charset="0"/>
-                  </a:rPr>
-                  <a:t>Or</a:t>
-                </a:r>
-              </a:p>
-              <a:p>
-                <a:pPr algn="ctr"/>
-                <a:r>
-                  <a:rPr lang="en-US" sz="1600" b="1" dirty="0" smtClean="0">
-                    <a:latin typeface="Times New Roman" panose="02020603050405020304" pitchFamily="18" charset="0"/>
-                    <a:cs typeface="Times New Roman" panose="02020603050405020304" pitchFamily="18" charset="0"/>
-                  </a:rPr>
-                  <a:t>ECL</a:t>
-                </a:r>
-                <a:endParaRPr lang="en-US" sz="1600" b="1" dirty="0">
-                  <a:latin typeface="Times New Roman" panose="02020603050405020304" pitchFamily="18" charset="0"/>
-                  <a:cs typeface="Times New Roman" panose="02020603050405020304" pitchFamily="18" charset="0"/>
-                </a:endParaRPr>
-              </a:p>
-            </p:txBody>
-          </p:sp>
-          <p:sp>
-            <p:nvSpPr>
-              <p:cNvPr id="62" name="Rectangle 61"/>
-              <p:cNvSpPr/>
-              <p:nvPr/>
-            </p:nvSpPr>
-            <p:spPr>
-              <a:xfrm>
-                <a:off x="7261709" y="775959"/>
-                <a:ext cx="948583" cy="643908"/>
-              </a:xfrm>
-              <a:prstGeom prst="rect">
-                <a:avLst/>
-              </a:prstGeom>
-              <a:ln w="28575">
-                <a:solidFill>
-                  <a:schemeClr val="tx1"/>
-                </a:solidFill>
-              </a:ln>
-            </p:spPr>
-            <p:style>
-              <a:lnRef idx="2">
-                <a:schemeClr val="dk1"/>
-              </a:lnRef>
-              <a:fillRef idx="1">
-                <a:schemeClr val="lt1"/>
-              </a:fillRef>
-              <a:effectRef idx="0">
-                <a:schemeClr val="dk1"/>
-              </a:effectRef>
-              <a:fontRef idx="minor">
-                <a:schemeClr val="dk1"/>
-              </a:fontRef>
-            </p:style>
-            <p:txBody>
-              <a:bodyPr rtlCol="0" anchor="ctr"/>
-              <a:lstStyle/>
-              <a:p>
-                <a:pPr algn="ctr"/>
-                <a:r>
-                  <a:rPr lang="en-US" sz="2000" b="1" dirty="0" smtClean="0">
-                    <a:latin typeface="Times New Roman" panose="02020603050405020304" pitchFamily="18" charset="0"/>
-                    <a:cs typeface="Times New Roman" panose="02020603050405020304" pitchFamily="18" charset="0"/>
-                  </a:rPr>
-                  <a:t>BPD</a:t>
-                </a:r>
-              </a:p>
-            </p:txBody>
-          </p:sp>
-          <p:cxnSp>
-            <p:nvCxnSpPr>
-              <p:cNvPr id="64" name="Straight Arrow Connector 63"/>
-              <p:cNvCxnSpPr/>
-              <p:nvPr/>
-            </p:nvCxnSpPr>
-            <p:spPr>
-              <a:xfrm>
-                <a:off x="6606698" y="911357"/>
-                <a:ext cx="655011" cy="0"/>
-              </a:xfrm>
-              <a:prstGeom prst="straightConnector1">
-                <a:avLst/>
-              </a:prstGeom>
-              <a:ln w="28575">
-                <a:solidFill>
-                  <a:schemeClr val="tx1"/>
-                </a:solidFill>
-                <a:tailEnd type="triangle"/>
-              </a:ln>
-            </p:spPr>
-            <p:style>
-              <a:lnRef idx="1">
-                <a:schemeClr val="accent1"/>
-              </a:lnRef>
-              <a:fillRef idx="0">
-                <a:schemeClr val="accent1"/>
-              </a:fillRef>
-              <a:effectRef idx="0">
-                <a:schemeClr val="accent1"/>
-              </a:effectRef>
-              <a:fontRef idx="minor">
-                <a:schemeClr val="tx1"/>
-              </a:fontRef>
-            </p:style>
-          </p:cxnSp>
-          <p:cxnSp>
-            <p:nvCxnSpPr>
-              <p:cNvPr id="66" name="Straight Arrow Connector 65"/>
-              <p:cNvCxnSpPr/>
-              <p:nvPr/>
-            </p:nvCxnSpPr>
-            <p:spPr>
-              <a:xfrm>
-                <a:off x="6606698" y="1285160"/>
-                <a:ext cx="655011" cy="0"/>
-              </a:xfrm>
-              <a:prstGeom prst="straightConnector1">
-                <a:avLst/>
-              </a:prstGeom>
-              <a:ln w="28575">
-                <a:solidFill>
-                  <a:schemeClr val="tx1"/>
-                </a:solidFill>
-                <a:tailEnd type="triangle"/>
-              </a:ln>
-            </p:spPr>
-            <p:style>
-              <a:lnRef idx="1">
-                <a:schemeClr val="accent1"/>
-              </a:lnRef>
-              <a:fillRef idx="0">
-                <a:schemeClr val="accent1"/>
-              </a:fillRef>
-              <a:effectRef idx="0">
-                <a:schemeClr val="accent1"/>
-              </a:effectRef>
-              <a:fontRef idx="minor">
-                <a:schemeClr val="tx1"/>
-              </a:fontRef>
-            </p:style>
-          </p:cxnSp>
-          <p:sp>
-            <p:nvSpPr>
-              <p:cNvPr id="67" name="Rectangle 66"/>
-              <p:cNvSpPr/>
-              <p:nvPr/>
-            </p:nvSpPr>
-            <p:spPr>
-              <a:xfrm>
-                <a:off x="7261709" y="1666820"/>
-                <a:ext cx="948583" cy="643908"/>
-              </a:xfrm>
-              <a:prstGeom prst="rect">
-                <a:avLst/>
-              </a:prstGeom>
-              <a:ln w="28575">
-                <a:solidFill>
-                  <a:schemeClr val="tx1"/>
-                </a:solidFill>
-              </a:ln>
-            </p:spPr>
-            <p:style>
-              <a:lnRef idx="2">
-                <a:schemeClr val="dk1"/>
-              </a:lnRef>
-              <a:fillRef idx="1">
-                <a:schemeClr val="lt1"/>
-              </a:fillRef>
-              <a:effectRef idx="0">
-                <a:schemeClr val="dk1"/>
-              </a:effectRef>
-              <a:fontRef idx="minor">
-                <a:schemeClr val="dk1"/>
-              </a:fontRef>
-            </p:style>
-            <p:txBody>
-              <a:bodyPr rtlCol="0" anchor="ctr"/>
-              <a:lstStyle/>
-              <a:p>
-                <a:pPr algn="ctr"/>
-                <a:r>
-                  <a:rPr lang="en-US" sz="2000" b="1" dirty="0" smtClean="0">
-                    <a:latin typeface="Times New Roman" panose="02020603050405020304" pitchFamily="18" charset="0"/>
-                    <a:cs typeface="Times New Roman" panose="02020603050405020304" pitchFamily="18" charset="0"/>
-                  </a:rPr>
-                  <a:t>BPD</a:t>
-                </a:r>
-              </a:p>
-            </p:txBody>
-          </p:sp>
-          <p:cxnSp>
-            <p:nvCxnSpPr>
-              <p:cNvPr id="68" name="Straight Arrow Connector 67"/>
-              <p:cNvCxnSpPr/>
-              <p:nvPr/>
-            </p:nvCxnSpPr>
-            <p:spPr>
-              <a:xfrm>
-                <a:off x="6606698" y="1802218"/>
-                <a:ext cx="655011" cy="0"/>
-              </a:xfrm>
-              <a:prstGeom prst="straightConnector1">
-                <a:avLst/>
-              </a:prstGeom>
-              <a:ln w="28575">
-                <a:solidFill>
-                  <a:schemeClr val="tx1"/>
-                </a:solidFill>
-                <a:tailEnd type="triangle"/>
-              </a:ln>
-            </p:spPr>
-            <p:style>
-              <a:lnRef idx="1">
-                <a:schemeClr val="accent1"/>
-              </a:lnRef>
-              <a:fillRef idx="0">
-                <a:schemeClr val="accent1"/>
-              </a:fillRef>
-              <a:effectRef idx="0">
-                <a:schemeClr val="accent1"/>
-              </a:effectRef>
-              <a:fontRef idx="minor">
-                <a:schemeClr val="tx1"/>
-              </a:fontRef>
-            </p:style>
-          </p:cxnSp>
-          <p:cxnSp>
-            <p:nvCxnSpPr>
-              <p:cNvPr id="69" name="Straight Arrow Connector 68"/>
-              <p:cNvCxnSpPr/>
-              <p:nvPr/>
-            </p:nvCxnSpPr>
-            <p:spPr>
-              <a:xfrm>
-                <a:off x="6606698" y="2176021"/>
-                <a:ext cx="655011" cy="0"/>
-              </a:xfrm>
-              <a:prstGeom prst="straightConnector1">
-                <a:avLst/>
-              </a:prstGeom>
-              <a:ln w="28575">
-                <a:solidFill>
-                  <a:schemeClr val="tx1"/>
-                </a:solidFill>
-                <a:tailEnd type="triangle"/>
-              </a:ln>
-            </p:spPr>
-            <p:style>
-              <a:lnRef idx="1">
-                <a:schemeClr val="accent1"/>
-              </a:lnRef>
-              <a:fillRef idx="0">
-                <a:schemeClr val="accent1"/>
-              </a:fillRef>
-              <a:effectRef idx="0">
-                <a:schemeClr val="accent1"/>
-              </a:effectRef>
-              <a:fontRef idx="minor">
-                <a:schemeClr val="tx1"/>
-              </a:fontRef>
-            </p:style>
-          </p:cxnSp>
-          <p:cxnSp>
-            <p:nvCxnSpPr>
-              <p:cNvPr id="73" name="Straight Arrow Connector 72"/>
-              <p:cNvCxnSpPr>
-                <a:stCxn id="62" idx="3"/>
-              </p:cNvCxnSpPr>
-              <p:nvPr/>
-            </p:nvCxnSpPr>
-            <p:spPr>
-              <a:xfrm>
-                <a:off x="8210292" y="1097913"/>
-                <a:ext cx="854082" cy="0"/>
-              </a:xfrm>
-              <a:prstGeom prst="straightConnector1">
-                <a:avLst/>
-              </a:prstGeom>
-              <a:ln w="28575">
-                <a:solidFill>
-                  <a:schemeClr val="tx1"/>
-                </a:solidFill>
-                <a:tailEnd type="triangle"/>
-              </a:ln>
-            </p:spPr>
-            <p:style>
-              <a:lnRef idx="1">
-                <a:schemeClr val="accent1"/>
-              </a:lnRef>
-              <a:fillRef idx="0">
-                <a:schemeClr val="accent1"/>
-              </a:fillRef>
-              <a:effectRef idx="0">
-                <a:schemeClr val="accent1"/>
-              </a:effectRef>
-              <a:fontRef idx="minor">
-                <a:schemeClr val="tx1"/>
-              </a:fontRef>
-            </p:style>
-          </p:cxnSp>
-          <p:cxnSp>
-            <p:nvCxnSpPr>
-              <p:cNvPr id="75" name="Straight Arrow Connector 74"/>
-              <p:cNvCxnSpPr>
-                <a:stCxn id="67" idx="3"/>
-              </p:cNvCxnSpPr>
-              <p:nvPr/>
-            </p:nvCxnSpPr>
-            <p:spPr>
-              <a:xfrm>
-                <a:off x="8210292" y="1988774"/>
-                <a:ext cx="854082" cy="0"/>
-              </a:xfrm>
-              <a:prstGeom prst="straightConnector1">
-                <a:avLst/>
-              </a:prstGeom>
-              <a:ln w="28575">
-                <a:solidFill>
-                  <a:schemeClr val="tx1"/>
-                </a:solidFill>
-                <a:tailEnd type="triangle"/>
-              </a:ln>
-            </p:spPr>
-            <p:style>
-              <a:lnRef idx="1">
-                <a:schemeClr val="accent1"/>
-              </a:lnRef>
-              <a:fillRef idx="0">
-                <a:schemeClr val="accent1"/>
-              </a:fillRef>
-              <a:effectRef idx="0">
-                <a:schemeClr val="accent1"/>
-              </a:effectRef>
-              <a:fontRef idx="minor">
-                <a:schemeClr val="tx1"/>
-              </a:fontRef>
-            </p:style>
-          </p:cxnSp>
-          <p:sp>
-            <p:nvSpPr>
-              <p:cNvPr id="78" name="Rectangle 77"/>
-              <p:cNvSpPr/>
-              <p:nvPr/>
-            </p:nvSpPr>
-            <p:spPr>
-              <a:xfrm>
-                <a:off x="9064374" y="638620"/>
-                <a:ext cx="746760" cy="1810835"/>
-              </a:xfrm>
-              <a:prstGeom prst="rect">
-                <a:avLst/>
-              </a:prstGeom>
-              <a:ln w="28575">
-                <a:solidFill>
-                  <a:schemeClr val="tx1"/>
-                </a:solidFill>
-              </a:ln>
-            </p:spPr>
-            <p:style>
-              <a:lnRef idx="2">
-                <a:schemeClr val="dk1"/>
-              </a:lnRef>
-              <a:fillRef idx="1">
-                <a:schemeClr val="lt1"/>
-              </a:fillRef>
-              <a:effectRef idx="0">
-                <a:schemeClr val="dk1"/>
-              </a:effectRef>
-              <a:fontRef idx="minor">
-                <a:schemeClr val="dk1"/>
-              </a:fontRef>
-            </p:style>
-            <p:txBody>
-              <a:bodyPr rtlCol="0" anchor="ctr"/>
-              <a:lstStyle/>
-              <a:p>
-                <a:pPr algn="ctr"/>
-                <a:r>
-                  <a:rPr lang="en-US" sz="2000" b="1" dirty="0" smtClean="0">
-                    <a:latin typeface="Times New Roman" panose="02020603050405020304" pitchFamily="18" charset="0"/>
-                    <a:cs typeface="Times New Roman" panose="02020603050405020304" pitchFamily="18" charset="0"/>
-                  </a:rPr>
-                  <a:t>Rx</a:t>
-                </a:r>
-              </a:p>
-              <a:p>
-                <a:pPr algn="ctr"/>
-                <a:r>
-                  <a:rPr lang="en-US" sz="2000" b="1" dirty="0" smtClean="0">
-                    <a:latin typeface="Times New Roman" panose="02020603050405020304" pitchFamily="18" charset="0"/>
-                    <a:cs typeface="Times New Roman" panose="02020603050405020304" pitchFamily="18" charset="0"/>
-                  </a:rPr>
-                  <a:t>DSP</a:t>
-                </a:r>
-                <a:endParaRPr lang="en-US" sz="2000" b="1" dirty="0">
-                  <a:latin typeface="Times New Roman" panose="02020603050405020304" pitchFamily="18" charset="0"/>
-                  <a:cs typeface="Times New Roman" panose="02020603050405020304" pitchFamily="18" charset="0"/>
-                </a:endParaRPr>
-              </a:p>
-            </p:txBody>
-          </p:sp>
-          <p:cxnSp>
-            <p:nvCxnSpPr>
-              <p:cNvPr id="85" name="Straight Arrow Connector 84"/>
-              <p:cNvCxnSpPr>
-                <a:stCxn id="61" idx="3"/>
-                <a:endCxn id="25" idx="1"/>
-              </p:cNvCxnSpPr>
-              <p:nvPr/>
-            </p:nvCxnSpPr>
-            <p:spPr>
-              <a:xfrm>
-                <a:off x="4362779" y="2171717"/>
-                <a:ext cx="456871" cy="1"/>
-              </a:xfrm>
-              <a:prstGeom prst="straightConnector1">
-                <a:avLst/>
-              </a:prstGeom>
-              <a:ln w="28575">
-                <a:solidFill>
-                  <a:schemeClr val="tx1"/>
-                </a:solidFill>
-                <a:tailEnd type="triangle"/>
-              </a:ln>
-            </p:spPr>
-            <p:style>
-              <a:lnRef idx="1">
-                <a:schemeClr val="accent1"/>
-              </a:lnRef>
-              <a:fillRef idx="0">
-                <a:schemeClr val="accent1"/>
-              </a:fillRef>
-              <a:effectRef idx="0">
-                <a:schemeClr val="accent1"/>
               </a:effectRef>
               <a:fontRef idx="minor">
                 <a:schemeClr val="tx1"/>
@@ -4077,21 +4065,379 @@
         </p:grpSp>
         <p:cxnSp>
           <p:nvCxnSpPr>
-            <p:cNvPr id="92" name="Straight Arrow Connector 91"/>
+            <p:cNvPr id="41" name="Elbow Connector 40"/>
+            <p:cNvCxnSpPr>
+              <a:stCxn id="14" idx="2"/>
+            </p:cNvCxnSpPr>
+            <p:nvPr/>
+          </p:nvCxnSpPr>
+          <p:spPr>
+            <a:xfrm rot="16200000" flipH="1">
+              <a:off x="4929863" y="2193786"/>
+              <a:ext cx="179588" cy="601675"/>
+            </a:xfrm>
+            <a:prstGeom prst="bentConnector2">
+              <a:avLst/>
+            </a:prstGeom>
+            <a:ln w="28575">
+              <a:solidFill>
+                <a:srgbClr val="00B050"/>
+              </a:solidFill>
+            </a:ln>
+          </p:spPr>
+          <p:style>
+            <a:lnRef idx="1">
+              <a:schemeClr val="accent1"/>
+            </a:lnRef>
+            <a:fillRef idx="0">
+              <a:schemeClr val="accent1"/>
+            </a:fillRef>
+            <a:effectRef idx="0">
+              <a:schemeClr val="accent1"/>
+            </a:effectRef>
+            <a:fontRef idx="minor">
+              <a:schemeClr val="tx1"/>
+            </a:fontRef>
+          </p:style>
+        </p:cxnSp>
+        <p:cxnSp>
+          <p:nvCxnSpPr>
+            <p:cNvPr id="43" name="Elbow Connector 42"/>
             <p:cNvCxnSpPr/>
             <p:nvPr/>
           </p:nvCxnSpPr>
           <p:spPr>
-            <a:xfrm flipV="1">
-              <a:off x="11355177" y="3074642"/>
-              <a:ext cx="655848" cy="1"/>
+            <a:xfrm rot="16200000" flipH="1">
+              <a:off x="5086814" y="2795313"/>
+              <a:ext cx="843916" cy="391474"/>
+            </a:xfrm>
+            <a:prstGeom prst="bentConnector3">
+              <a:avLst>
+                <a:gd name="adj1" fmla="val 100311"/>
+              </a:avLst>
+            </a:prstGeom>
+            <a:ln w="28575">
+              <a:solidFill>
+                <a:srgbClr val="00B050"/>
+              </a:solidFill>
+              <a:tailEnd type="triangle"/>
+            </a:ln>
+          </p:spPr>
+          <p:style>
+            <a:lnRef idx="1">
+              <a:schemeClr val="accent1"/>
+            </a:lnRef>
+            <a:fillRef idx="0">
+              <a:schemeClr val="accent1"/>
+            </a:fillRef>
+            <a:effectRef idx="0">
+              <a:schemeClr val="accent1"/>
+            </a:effectRef>
+            <a:fontRef idx="minor">
+              <a:schemeClr val="tx1"/>
+            </a:fontRef>
+          </p:style>
+        </p:cxnSp>
+        <p:sp>
+          <p:nvSpPr>
+            <p:cNvPr id="59" name="Rectangle 58"/>
+            <p:cNvSpPr/>
+            <p:nvPr/>
+          </p:nvSpPr>
+          <p:spPr>
+            <a:xfrm>
+              <a:off x="5704508" y="3236809"/>
+              <a:ext cx="1138801" cy="850445"/>
+            </a:xfrm>
+            <a:prstGeom prst="rect">
+              <a:avLst/>
+            </a:prstGeom>
+            <a:solidFill>
+              <a:schemeClr val="accent4">
+                <a:lumMod val="60000"/>
+                <a:lumOff val="40000"/>
+              </a:schemeClr>
+            </a:solidFill>
+            <a:ln w="28575">
+              <a:solidFill>
+                <a:schemeClr val="tx1"/>
+              </a:solidFill>
+            </a:ln>
+          </p:spPr>
+          <p:style>
+            <a:lnRef idx="2">
+              <a:schemeClr val="dk1"/>
+            </a:lnRef>
+            <a:fillRef idx="1">
+              <a:schemeClr val="lt1"/>
+            </a:fillRef>
+            <a:effectRef idx="0">
+              <a:schemeClr val="dk1"/>
+            </a:effectRef>
+            <a:fontRef idx="minor">
+              <a:schemeClr val="dk1"/>
+            </a:fontRef>
+          </p:style>
+          <p:txBody>
+            <a:bodyPr rtlCol="0" anchor="ctr"/>
+            <a:lstStyle/>
+            <a:p>
+              <a:pPr algn="ctr"/>
+              <a:r>
+                <a:rPr lang="en-US" sz="2000" b="1" dirty="0">
+                  <a:latin typeface="Times New Roman" panose="02020603050405020304" pitchFamily="18" charset="0"/>
+                  <a:cs typeface="Times New Roman" panose="02020603050405020304" pitchFamily="18" charset="0"/>
+                </a:rPr>
+                <a:t>2x2</a:t>
+              </a:r>
+            </a:p>
+            <a:p>
+              <a:pPr algn="ctr"/>
+              <a:r>
+                <a:rPr lang="en-US" sz="2000" b="1" dirty="0">
+                  <a:latin typeface="Times New Roman" panose="02020603050405020304" pitchFamily="18" charset="0"/>
+                  <a:cs typeface="Times New Roman" panose="02020603050405020304" pitchFamily="18" charset="0"/>
+                </a:rPr>
+                <a:t>Coupler</a:t>
+              </a:r>
+            </a:p>
+          </p:txBody>
+        </p:sp>
+        <p:sp>
+          <p:nvSpPr>
+            <p:cNvPr id="62" name="Rectangle 61"/>
+            <p:cNvSpPr/>
+            <p:nvPr/>
+          </p:nvSpPr>
+          <p:spPr>
+            <a:xfrm>
+              <a:off x="7629669" y="2060200"/>
+              <a:ext cx="1138801" cy="850445"/>
+            </a:xfrm>
+            <a:prstGeom prst="rect">
+              <a:avLst/>
+            </a:prstGeom>
+            <a:solidFill>
+              <a:schemeClr val="accent4">
+                <a:lumMod val="60000"/>
+                <a:lumOff val="40000"/>
+              </a:schemeClr>
+            </a:solidFill>
+            <a:ln w="28575">
+              <a:solidFill>
+                <a:schemeClr val="tx1"/>
+              </a:solidFill>
+            </a:ln>
+          </p:spPr>
+          <p:style>
+            <a:lnRef idx="2">
+              <a:schemeClr val="dk1"/>
+            </a:lnRef>
+            <a:fillRef idx="1">
+              <a:schemeClr val="lt1"/>
+            </a:fillRef>
+            <a:effectRef idx="0">
+              <a:schemeClr val="dk1"/>
+            </a:effectRef>
+            <a:fontRef idx="minor">
+              <a:schemeClr val="dk1"/>
+            </a:fontRef>
+          </p:style>
+          <p:txBody>
+            <a:bodyPr rtlCol="0" anchor="ctr"/>
+            <a:lstStyle/>
+            <a:p>
+              <a:pPr algn="ctr"/>
+              <a:r>
+                <a:rPr lang="en-US" sz="2000" b="1" dirty="0" smtClean="0">
+                  <a:latin typeface="Times New Roman" panose="02020603050405020304" pitchFamily="18" charset="0"/>
+                  <a:cs typeface="Times New Roman" panose="02020603050405020304" pitchFamily="18" charset="0"/>
+                </a:rPr>
+                <a:t>BPD</a:t>
+              </a:r>
+            </a:p>
+          </p:txBody>
+        </p:sp>
+        <p:cxnSp>
+          <p:nvCxnSpPr>
+            <p:cNvPr id="64" name="Straight Arrow Connector 63"/>
+            <p:cNvCxnSpPr/>
+            <p:nvPr/>
+          </p:nvCxnSpPr>
+          <p:spPr>
+            <a:xfrm>
+              <a:off x="6843310" y="2239028"/>
+              <a:ext cx="786360" cy="0"/>
             </a:xfrm>
             <a:prstGeom prst="straightConnector1">
               <a:avLst/>
             </a:prstGeom>
             <a:ln w="28575">
               <a:solidFill>
+                <a:srgbClr val="00B0F0"/>
+              </a:solidFill>
+              <a:tailEnd type="triangle"/>
+            </a:ln>
+          </p:spPr>
+          <p:style>
+            <a:lnRef idx="1">
+              <a:schemeClr val="accent1"/>
+            </a:lnRef>
+            <a:fillRef idx="0">
+              <a:schemeClr val="accent1"/>
+            </a:fillRef>
+            <a:effectRef idx="0">
+              <a:schemeClr val="accent1"/>
+            </a:effectRef>
+            <a:fontRef idx="minor">
+              <a:schemeClr val="tx1"/>
+            </a:fontRef>
+          </p:style>
+        </p:cxnSp>
+        <p:cxnSp>
+          <p:nvCxnSpPr>
+            <p:cNvPr id="66" name="Straight Arrow Connector 65"/>
+            <p:cNvCxnSpPr/>
+            <p:nvPr/>
+          </p:nvCxnSpPr>
+          <p:spPr>
+            <a:xfrm>
+              <a:off x="6843310" y="2732730"/>
+              <a:ext cx="786360" cy="0"/>
+            </a:xfrm>
+            <a:prstGeom prst="straightConnector1">
+              <a:avLst/>
+            </a:prstGeom>
+            <a:ln w="28575">
+              <a:solidFill>
+                <a:srgbClr val="00B0F0"/>
+              </a:solidFill>
+              <a:tailEnd type="triangle"/>
+            </a:ln>
+          </p:spPr>
+          <p:style>
+            <a:lnRef idx="1">
+              <a:schemeClr val="accent1"/>
+            </a:lnRef>
+            <a:fillRef idx="0">
+              <a:schemeClr val="accent1"/>
+            </a:fillRef>
+            <a:effectRef idx="0">
+              <a:schemeClr val="accent1"/>
+            </a:effectRef>
+            <a:fontRef idx="minor">
+              <a:schemeClr val="tx1"/>
+            </a:fontRef>
+          </p:style>
+        </p:cxnSp>
+        <p:sp>
+          <p:nvSpPr>
+            <p:cNvPr id="67" name="Rectangle 66"/>
+            <p:cNvSpPr/>
+            <p:nvPr/>
+          </p:nvSpPr>
+          <p:spPr>
+            <a:xfrm>
+              <a:off x="7629669" y="3236809"/>
+              <a:ext cx="1138801" cy="850445"/>
+            </a:xfrm>
+            <a:prstGeom prst="rect">
+              <a:avLst/>
+            </a:prstGeom>
+            <a:solidFill>
+              <a:schemeClr val="accent4">
+                <a:lumMod val="60000"/>
+                <a:lumOff val="40000"/>
+              </a:schemeClr>
+            </a:solidFill>
+            <a:ln w="28575">
+              <a:solidFill>
                 <a:schemeClr val="tx1"/>
+              </a:solidFill>
+            </a:ln>
+          </p:spPr>
+          <p:style>
+            <a:lnRef idx="2">
+              <a:schemeClr val="dk1"/>
+            </a:lnRef>
+            <a:fillRef idx="1">
+              <a:schemeClr val="lt1"/>
+            </a:fillRef>
+            <a:effectRef idx="0">
+              <a:schemeClr val="dk1"/>
+            </a:effectRef>
+            <a:fontRef idx="minor">
+              <a:schemeClr val="dk1"/>
+            </a:fontRef>
+          </p:style>
+          <p:txBody>
+            <a:bodyPr rtlCol="0" anchor="ctr"/>
+            <a:lstStyle/>
+            <a:p>
+              <a:pPr algn="ctr"/>
+              <a:r>
+                <a:rPr lang="en-US" sz="2000" b="1" dirty="0" smtClean="0">
+                  <a:latin typeface="Times New Roman" panose="02020603050405020304" pitchFamily="18" charset="0"/>
+                  <a:cs typeface="Times New Roman" panose="02020603050405020304" pitchFamily="18" charset="0"/>
+                </a:rPr>
+                <a:t>BPD</a:t>
+              </a:r>
+            </a:p>
+          </p:txBody>
+        </p:sp>
+        <p:cxnSp>
+          <p:nvCxnSpPr>
+            <p:cNvPr id="68" name="Straight Arrow Connector 67"/>
+            <p:cNvCxnSpPr/>
+            <p:nvPr/>
+          </p:nvCxnSpPr>
+          <p:spPr>
+            <a:xfrm>
+              <a:off x="6843310" y="3415637"/>
+              <a:ext cx="786360" cy="0"/>
+            </a:xfrm>
+            <a:prstGeom prst="straightConnector1">
+              <a:avLst/>
+            </a:prstGeom>
+            <a:ln w="28575">
+              <a:solidFill>
+                <a:srgbClr val="00B050"/>
+              </a:solidFill>
+              <a:tailEnd type="triangle"/>
+            </a:ln>
+          </p:spPr>
+          <p:style>
+            <a:lnRef idx="1">
+              <a:schemeClr val="accent1"/>
+            </a:lnRef>
+            <a:fillRef idx="0">
+              <a:schemeClr val="accent1"/>
+            </a:fillRef>
+            <a:effectRef idx="0">
+              <a:schemeClr val="accent1"/>
+            </a:effectRef>
+            <a:fontRef idx="minor">
+              <a:schemeClr val="tx1"/>
+            </a:fontRef>
+          </p:style>
+        </p:cxnSp>
+        <p:cxnSp>
+          <p:nvCxnSpPr>
+            <p:cNvPr id="69" name="Straight Arrow Connector 68"/>
+            <p:cNvCxnSpPr/>
+            <p:nvPr/>
+          </p:nvCxnSpPr>
+          <p:spPr>
+            <a:xfrm>
+              <a:off x="6843310" y="3909339"/>
+              <a:ext cx="786360" cy="0"/>
+            </a:xfrm>
+            <a:prstGeom prst="straightConnector1">
+              <a:avLst/>
+            </a:prstGeom>
+            <a:ln w="28575">
+              <a:solidFill>
+                <a:srgbClr val="00B050"/>
               </a:solidFill>
               <a:tailEnd type="triangle"/>
             </a:ln>
@@ -4119,8 +4465,8 @@
           </p:nvSpPr>
           <p:spPr>
             <a:xfrm>
-              <a:off x="5141707" y="1801699"/>
-              <a:ext cx="666982" cy="225360"/>
+              <a:off x="4391704" y="1791687"/>
+              <a:ext cx="663185" cy="225360"/>
             </a:xfrm>
             <a:prstGeom prst="rect">
               <a:avLst/>
@@ -4185,8 +4531,8 @@
           </p:nvSpPr>
           <p:spPr>
             <a:xfrm>
-              <a:off x="5173216" y="4128250"/>
-              <a:ext cx="666982" cy="225360"/>
+              <a:off x="4384242" y="2986778"/>
+              <a:ext cx="663185" cy="225360"/>
             </a:xfrm>
             <a:prstGeom prst="rect">
               <a:avLst/>
@@ -4245,80 +4591,14 @@
         </p:sp>
         <p:sp>
           <p:nvSpPr>
-            <p:cNvPr id="101" name="Rectangle 100"/>
-            <p:cNvSpPr/>
-            <p:nvPr/>
-          </p:nvSpPr>
-          <p:spPr>
-            <a:xfrm>
-              <a:off x="10429359" y="1489843"/>
-              <a:ext cx="945100" cy="291826"/>
-            </a:xfrm>
-            <a:prstGeom prst="rect">
-              <a:avLst/>
-            </a:prstGeom>
-            <a:solidFill>
-              <a:schemeClr val="accent1">
-                <a:alpha val="0"/>
-              </a:schemeClr>
-            </a:solidFill>
-            <a:ln>
-              <a:solidFill>
-                <a:schemeClr val="bg1"/>
-              </a:solidFill>
-            </a:ln>
-          </p:spPr>
-          <p:style>
-            <a:lnRef idx="2">
-              <a:schemeClr val="accent1">
-                <a:shade val="50000"/>
-              </a:schemeClr>
-            </a:lnRef>
-            <a:fillRef idx="1">
-              <a:schemeClr val="accent1"/>
-            </a:fillRef>
-            <a:effectRef idx="0">
-              <a:schemeClr val="accent1"/>
-            </a:effectRef>
-            <a:fontRef idx="minor">
-              <a:schemeClr val="lt1"/>
-            </a:fontRef>
-          </p:style>
-          <p:txBody>
-            <a:bodyPr rtlCol="0" anchor="ctr"/>
-            <a:lstStyle/>
-            <a:p>
-              <a:pPr algn="ctr"/>
-              <a:r>
-                <a:rPr lang="en-US" sz="2000" b="1" dirty="0" smtClean="0">
-                  <a:solidFill>
-                    <a:schemeClr val="tx1"/>
-                  </a:solidFill>
-                  <a:latin typeface="Times New Roman" panose="02020603050405020304" pitchFamily="18" charset="0"/>
-                  <a:cs typeface="Times New Roman" panose="02020603050405020304" pitchFamily="18" charset="0"/>
-                </a:rPr>
-                <a:t>FPGA</a:t>
-              </a:r>
-              <a:endParaRPr lang="en-US" sz="2000" b="1" dirty="0">
-                <a:solidFill>
-                  <a:schemeClr val="tx1"/>
-                </a:solidFill>
-                <a:latin typeface="Times New Roman" panose="02020603050405020304" pitchFamily="18" charset="0"/>
-                <a:cs typeface="Times New Roman" panose="02020603050405020304" pitchFamily="18" charset="0"/>
-              </a:endParaRPr>
-            </a:p>
-          </p:txBody>
-        </p:sp>
-        <p:sp>
-          <p:nvSpPr>
             <p:cNvPr id="102" name="Rectangle 101"/>
             <p:cNvSpPr/>
             <p:nvPr/>
           </p:nvSpPr>
           <p:spPr>
             <a:xfrm>
-              <a:off x="6143956" y="1441876"/>
-              <a:ext cx="3436137" cy="379418"/>
+              <a:off x="4987964" y="1374507"/>
+              <a:ext cx="3416576" cy="379418"/>
             </a:xfrm>
             <a:prstGeom prst="rect">
               <a:avLst/>
@@ -4375,319 +4655,98 @@
             </a:p>
           </p:txBody>
         </p:sp>
-        <p:grpSp>
-          <p:nvGrpSpPr>
-            <p:cNvPr id="90" name="Group 89"/>
-            <p:cNvGrpSpPr/>
-            <p:nvPr/>
-          </p:nvGrpSpPr>
-          <p:grpSpPr>
-            <a:xfrm>
-              <a:off x="228600" y="1859458"/>
-              <a:ext cx="2624311" cy="2411021"/>
-              <a:chOff x="832730" y="3654034"/>
-              <a:chExt cx="2173518" cy="1805856"/>
-            </a:xfrm>
-          </p:grpSpPr>
-          <p:grpSp>
-            <p:nvGrpSpPr>
-              <p:cNvPr id="12" name="Group 11"/>
-              <p:cNvGrpSpPr/>
-              <p:nvPr/>
-            </p:nvGrpSpPr>
-            <p:grpSpPr>
-              <a:xfrm>
-                <a:off x="1463198" y="3654034"/>
-                <a:ext cx="1543050" cy="1805856"/>
-                <a:chOff x="2691923" y="811848"/>
-                <a:chExt cx="1543050" cy="1805856"/>
-              </a:xfrm>
-            </p:grpSpPr>
-            <p:sp>
-              <p:nvSpPr>
-                <p:cNvPr id="5" name="Rectangle 4"/>
-                <p:cNvSpPr/>
-                <p:nvPr/>
-              </p:nvSpPr>
-              <p:spPr>
-                <a:xfrm>
-                  <a:off x="3286390" y="811848"/>
-                  <a:ext cx="948583" cy="555477"/>
-                </a:xfrm>
-                <a:prstGeom prst="rect">
-                  <a:avLst/>
-                </a:prstGeom>
-                <a:ln w="25400"/>
-              </p:spPr>
-              <p:style>
-                <a:lnRef idx="2">
-                  <a:schemeClr val="dk1"/>
-                </a:lnRef>
-                <a:fillRef idx="1">
-                  <a:schemeClr val="lt1"/>
-                </a:fillRef>
-                <a:effectRef idx="0">
-                  <a:schemeClr val="dk1"/>
-                </a:effectRef>
-                <a:fontRef idx="minor">
-                  <a:schemeClr val="dk1"/>
-                </a:fontRef>
-              </p:style>
-              <p:txBody>
-                <a:bodyPr rtlCol="0" anchor="ctr"/>
-                <a:lstStyle/>
-                <a:p>
-                  <a:pPr algn="ctr"/>
-                  <a:r>
-                    <a:rPr lang="en-US" b="1" dirty="0" smtClean="0">
-                      <a:latin typeface="Times New Roman" panose="02020603050405020304" pitchFamily="18" charset="0"/>
-                      <a:cs typeface="Times New Roman" panose="02020603050405020304" pitchFamily="18" charset="0"/>
-                    </a:rPr>
-                    <a:t>DP</a:t>
-                  </a:r>
-                </a:p>
-                <a:p>
-                  <a:pPr algn="ctr"/>
-                  <a:r>
-                    <a:rPr lang="en-US" b="1" dirty="0" smtClean="0">
-                      <a:latin typeface="Times New Roman" panose="02020603050405020304" pitchFamily="18" charset="0"/>
-                      <a:cs typeface="Times New Roman" panose="02020603050405020304" pitchFamily="18" charset="0"/>
-                    </a:rPr>
-                    <a:t>IQ-MOD</a:t>
-                  </a:r>
-                </a:p>
-              </p:txBody>
-            </p:sp>
-            <p:cxnSp>
-              <p:nvCxnSpPr>
-                <p:cNvPr id="7" name="Straight Arrow Connector 6"/>
-                <p:cNvCxnSpPr>
-                  <a:endCxn id="5" idx="1"/>
-                </p:cNvCxnSpPr>
-                <p:nvPr/>
-              </p:nvCxnSpPr>
-              <p:spPr>
-                <a:xfrm flipV="1">
-                  <a:off x="2691923" y="1089587"/>
-                  <a:ext cx="594467" cy="1"/>
-                </a:xfrm>
-                <a:prstGeom prst="straightConnector1">
-                  <a:avLst/>
-                </a:prstGeom>
-                <a:ln w="28575">
-                  <a:solidFill>
-                    <a:schemeClr val="tx1"/>
-                  </a:solidFill>
-                  <a:tailEnd type="triangle"/>
-                </a:ln>
-              </p:spPr>
-              <p:style>
-                <a:lnRef idx="1">
-                  <a:schemeClr val="accent1"/>
-                </a:lnRef>
-                <a:fillRef idx="0">
-                  <a:schemeClr val="accent1"/>
-                </a:fillRef>
-                <a:effectRef idx="0">
-                  <a:schemeClr val="accent1"/>
-                </a:effectRef>
-                <a:fontRef idx="minor">
-                  <a:schemeClr val="tx1"/>
-                </a:fontRef>
-              </p:style>
-            </p:cxnSp>
-            <p:sp>
-              <p:nvSpPr>
-                <p:cNvPr id="8" name="Rectangle 7"/>
-                <p:cNvSpPr/>
-                <p:nvPr/>
-              </p:nvSpPr>
-              <p:spPr>
-                <a:xfrm>
-                  <a:off x="3484588" y="2124627"/>
-                  <a:ext cx="552186" cy="493077"/>
-                </a:xfrm>
-                <a:prstGeom prst="rect">
-                  <a:avLst/>
-                </a:prstGeom>
-                <a:ln w="25400"/>
-              </p:spPr>
-              <p:style>
-                <a:lnRef idx="2">
-                  <a:schemeClr val="dk1"/>
-                </a:lnRef>
-                <a:fillRef idx="1">
-                  <a:schemeClr val="lt1"/>
-                </a:fillRef>
-                <a:effectRef idx="0">
-                  <a:schemeClr val="dk1"/>
-                </a:effectRef>
-                <a:fontRef idx="minor">
-                  <a:schemeClr val="dk1"/>
-                </a:fontRef>
-              </p:style>
-              <p:txBody>
-                <a:bodyPr rtlCol="0" anchor="ctr"/>
-                <a:lstStyle/>
-                <a:p>
-                  <a:pPr algn="ctr"/>
-                  <a:r>
-                    <a:rPr lang="en-US" sz="2000" b="1" dirty="0" err="1" smtClean="0">
-                      <a:latin typeface="Times New Roman" panose="02020603050405020304" pitchFamily="18" charset="0"/>
-                      <a:cs typeface="Times New Roman" panose="02020603050405020304" pitchFamily="18" charset="0"/>
-                    </a:rPr>
-                    <a:t>Tx</a:t>
-                  </a:r>
-                  <a:endParaRPr lang="en-US" sz="2000" b="1" dirty="0" smtClean="0">
-                    <a:latin typeface="Times New Roman" panose="02020603050405020304" pitchFamily="18" charset="0"/>
-                    <a:cs typeface="Times New Roman" panose="02020603050405020304" pitchFamily="18" charset="0"/>
-                  </a:endParaRPr>
-                </a:p>
-                <a:p>
-                  <a:pPr algn="ctr"/>
-                  <a:r>
-                    <a:rPr lang="en-US" sz="2000" b="1" dirty="0" smtClean="0">
-                      <a:latin typeface="Times New Roman" panose="02020603050405020304" pitchFamily="18" charset="0"/>
-                      <a:cs typeface="Times New Roman" panose="02020603050405020304" pitchFamily="18" charset="0"/>
-                    </a:rPr>
-                    <a:t>DSP</a:t>
-                  </a:r>
-                </a:p>
-              </p:txBody>
-            </p:sp>
-            <p:cxnSp>
-              <p:nvCxnSpPr>
-                <p:cNvPr id="10" name="Straight Arrow Connector 9"/>
-                <p:cNvCxnSpPr>
-                  <a:stCxn id="8" idx="0"/>
-                  <a:endCxn id="5" idx="2"/>
-                </p:cNvCxnSpPr>
-                <p:nvPr/>
-              </p:nvCxnSpPr>
-              <p:spPr>
-                <a:xfrm flipV="1">
-                  <a:off x="3760681" y="1367325"/>
-                  <a:ext cx="1" cy="757302"/>
-                </a:xfrm>
-                <a:prstGeom prst="straightConnector1">
-                  <a:avLst/>
-                </a:prstGeom>
-                <a:ln w="28575">
-                  <a:solidFill>
-                    <a:schemeClr val="tx1"/>
-                  </a:solidFill>
-                  <a:tailEnd type="triangle"/>
-                </a:ln>
-              </p:spPr>
-              <p:style>
-                <a:lnRef idx="1">
-                  <a:schemeClr val="accent1"/>
-                </a:lnRef>
-                <a:fillRef idx="0">
-                  <a:schemeClr val="accent1"/>
-                </a:fillRef>
-                <a:effectRef idx="0">
-                  <a:schemeClr val="accent1"/>
-                </a:effectRef>
-                <a:fontRef idx="minor">
-                  <a:schemeClr val="tx1"/>
-                </a:fontRef>
-              </p:style>
-            </p:cxnSp>
-          </p:grpSp>
-          <p:sp>
-            <p:nvSpPr>
-              <p:cNvPr id="89" name="Rectangle 88"/>
-              <p:cNvSpPr/>
-              <p:nvPr/>
-            </p:nvSpPr>
-            <p:spPr>
-              <a:xfrm>
-                <a:off x="832730" y="3654034"/>
-                <a:ext cx="618468" cy="555477"/>
-              </a:xfrm>
-              <a:prstGeom prst="rect">
-                <a:avLst/>
-              </a:prstGeom>
-              <a:ln w="28575">
-                <a:solidFill>
-                  <a:schemeClr val="tx1"/>
-                </a:solidFill>
-              </a:ln>
-            </p:spPr>
-            <p:style>
-              <a:lnRef idx="2">
-                <a:schemeClr val="dk1"/>
-              </a:lnRef>
-              <a:fillRef idx="1">
-                <a:schemeClr val="lt1"/>
-              </a:fillRef>
-              <a:effectRef idx="0">
-                <a:schemeClr val="dk1"/>
-              </a:effectRef>
-              <a:fontRef idx="minor">
-                <a:schemeClr val="dk1"/>
-              </a:fontRef>
-            </p:style>
-            <p:txBody>
-              <a:bodyPr rtlCol="0" anchor="ctr"/>
-              <a:lstStyle/>
-              <a:p>
-                <a:pPr algn="ctr"/>
-                <a:r>
-                  <a:rPr lang="en-US" sz="1600" b="1" dirty="0" smtClean="0">
-                    <a:latin typeface="Times New Roman" panose="02020603050405020304" pitchFamily="18" charset="0"/>
-                    <a:cs typeface="Times New Roman" panose="02020603050405020304" pitchFamily="18" charset="0"/>
-                  </a:rPr>
-                  <a:t>DFB</a:t>
-                </a:r>
-              </a:p>
-              <a:p>
-                <a:pPr algn="ctr"/>
-                <a:r>
-                  <a:rPr lang="en-US" sz="1600" b="1" dirty="0" smtClean="0">
-                    <a:latin typeface="Times New Roman" panose="02020603050405020304" pitchFamily="18" charset="0"/>
-                    <a:cs typeface="Times New Roman" panose="02020603050405020304" pitchFamily="18" charset="0"/>
-                  </a:rPr>
-                  <a:t>Or</a:t>
-                </a:r>
-              </a:p>
-              <a:p>
-                <a:pPr algn="ctr"/>
-                <a:r>
-                  <a:rPr lang="en-US" sz="1600" b="1" dirty="0" smtClean="0">
-                    <a:latin typeface="Times New Roman" panose="02020603050405020304" pitchFamily="18" charset="0"/>
-                    <a:cs typeface="Times New Roman" panose="02020603050405020304" pitchFamily="18" charset="0"/>
-                  </a:rPr>
-                  <a:t>ECL</a:t>
-                </a:r>
-                <a:endParaRPr lang="en-US" sz="1600" b="1" dirty="0">
-                  <a:latin typeface="Times New Roman" panose="02020603050405020304" pitchFamily="18" charset="0"/>
-                  <a:cs typeface="Times New Roman" panose="02020603050405020304" pitchFamily="18" charset="0"/>
-                </a:endParaRPr>
-              </a:p>
-            </p:txBody>
-          </p:sp>
-        </p:grpSp>
         <p:cxnSp>
           <p:nvCxnSpPr>
-            <p:cNvPr id="118" name="Straight Arrow Connector 117"/>
+            <p:cNvPr id="6" name="Elbow Connector 5"/>
             <p:cNvCxnSpPr>
-              <a:stCxn id="5" idx="3"/>
+              <a:stCxn id="25" idx="2"/>
+            </p:cNvCxnSpPr>
+            <p:nvPr/>
+          </p:nvCxnSpPr>
+          <p:spPr>
+            <a:xfrm rot="16200000" flipH="1">
+              <a:off x="5046798" y="3258916"/>
+              <a:ext cx="314810" cy="976735"/>
+            </a:xfrm>
+            <a:prstGeom prst="bentConnector2">
+              <a:avLst/>
+            </a:prstGeom>
+            <a:ln w="28575">
+              <a:solidFill>
+                <a:srgbClr val="00B050"/>
+              </a:solidFill>
+              <a:tailEnd type="triangle"/>
+            </a:ln>
+          </p:spPr>
+          <p:style>
+            <a:lnRef idx="1">
+              <a:schemeClr val="dk1"/>
+            </a:lnRef>
+            <a:fillRef idx="0">
+              <a:schemeClr val="dk1"/>
+            </a:fillRef>
+            <a:effectRef idx="0">
+              <a:schemeClr val="dk1"/>
+            </a:effectRef>
+            <a:fontRef idx="minor">
+              <a:schemeClr val="tx1"/>
+            </a:fontRef>
+          </p:style>
+        </p:cxnSp>
+        <p:cxnSp>
+          <p:nvCxnSpPr>
+            <p:cNvPr id="27" name="Elbow Connector 26"/>
+            <p:cNvCxnSpPr>
+              <a:stCxn id="25" idx="3"/>
             </p:cNvCxnSpPr>
             <p:nvPr/>
           </p:nvCxnSpPr>
           <p:spPr>
             <a:xfrm flipV="1">
-              <a:off x="2852911" y="2228083"/>
-              <a:ext cx="2433600" cy="2187"/>
+              <a:off x="4893079" y="2715660"/>
+              <a:ext cx="268270" cy="694630"/>
+            </a:xfrm>
+            <a:prstGeom prst="bentConnector2">
+              <a:avLst/>
+            </a:prstGeom>
+            <a:ln w="28575">
+              <a:solidFill>
+                <a:srgbClr val="00B0F0"/>
+              </a:solidFill>
+            </a:ln>
+          </p:spPr>
+          <p:style>
+            <a:lnRef idx="1">
+              <a:schemeClr val="accent1"/>
+            </a:lnRef>
+            <a:fillRef idx="0">
+              <a:schemeClr val="accent1"/>
+            </a:fillRef>
+            <a:effectRef idx="0">
+              <a:schemeClr val="accent1"/>
+            </a:effectRef>
+            <a:fontRef idx="minor">
+              <a:schemeClr val="tx1"/>
+            </a:fontRef>
+          </p:style>
+        </p:cxnSp>
+        <p:cxnSp>
+          <p:nvCxnSpPr>
+            <p:cNvPr id="35" name="Straight Arrow Connector 34"/>
+            <p:cNvCxnSpPr/>
+            <p:nvPr/>
+          </p:nvCxnSpPr>
+          <p:spPr>
+            <a:xfrm>
+              <a:off x="5160068" y="2727827"/>
+              <a:ext cx="539964" cy="1"/>
             </a:xfrm>
             <a:prstGeom prst="straightConnector1">
               <a:avLst/>
             </a:prstGeom>
             <a:ln w="28575">
               <a:solidFill>
-                <a:schemeClr val="tx1"/>
+                <a:srgbClr val="00B0F0"/>
               </a:solidFill>
               <a:tailEnd type="triangle"/>
             </a:ln>
@@ -4709,19 +4768,275 @@
         </p:cxnSp>
         <p:sp>
           <p:nvSpPr>
-            <p:cNvPr id="121" name="Oval 120"/>
+            <p:cNvPr id="93" name="Rectangle 92"/>
             <p:cNvSpPr/>
             <p:nvPr/>
           </p:nvSpPr>
           <p:spPr>
             <a:xfrm>
-              <a:off x="3643771" y="1681220"/>
-              <a:ext cx="313921" cy="557809"/>
+              <a:off x="4506320" y="3626121"/>
+              <a:ext cx="179665" cy="163337"/>
             </a:xfrm>
-            <a:prstGeom prst="ellipse">
+            <a:prstGeom prst="rect">
               <a:avLst/>
             </a:prstGeom>
-            <a:ln w="28575"/>
+            <a:solidFill>
+              <a:schemeClr val="accent1">
+                <a:alpha val="0"/>
+              </a:schemeClr>
+            </a:solidFill>
+            <a:ln>
+              <a:solidFill>
+                <a:schemeClr val="bg1"/>
+              </a:solidFill>
+            </a:ln>
+          </p:spPr>
+          <p:style>
+            <a:lnRef idx="2">
+              <a:schemeClr val="accent1">
+                <a:shade val="50000"/>
+              </a:schemeClr>
+            </a:lnRef>
+            <a:fillRef idx="1">
+              <a:schemeClr val="accent1"/>
+            </a:fillRef>
+            <a:effectRef idx="0">
+              <a:schemeClr val="accent1"/>
+            </a:effectRef>
+            <a:fontRef idx="minor">
+              <a:schemeClr val="lt1"/>
+            </a:fontRef>
+          </p:style>
+          <p:txBody>
+            <a:bodyPr rtlCol="0" anchor="ctr"/>
+            <a:lstStyle/>
+            <a:p>
+              <a:pPr algn="ctr"/>
+              <a:r>
+                <a:rPr lang="en-US" sz="1600" b="1" dirty="0" smtClean="0">
+                  <a:solidFill>
+                    <a:schemeClr val="tx1"/>
+                  </a:solidFill>
+                  <a:latin typeface="Times New Roman" panose="02020603050405020304" pitchFamily="18" charset="0"/>
+                  <a:cs typeface="Times New Roman" panose="02020603050405020304" pitchFamily="18" charset="0"/>
+                </a:rPr>
+                <a:t>Y</a:t>
+              </a:r>
+              <a:endParaRPr lang="en-US" sz="1600" b="1" dirty="0">
+                <a:solidFill>
+                  <a:schemeClr val="tx1"/>
+                </a:solidFill>
+                <a:latin typeface="Times New Roman" panose="02020603050405020304" pitchFamily="18" charset="0"/>
+                <a:cs typeface="Times New Roman" panose="02020603050405020304" pitchFamily="18" charset="0"/>
+              </a:endParaRPr>
+            </a:p>
+          </p:txBody>
+        </p:sp>
+        <p:sp>
+          <p:nvSpPr>
+            <p:cNvPr id="96" name="Rectangle 95"/>
+            <p:cNvSpPr/>
+            <p:nvPr/>
+          </p:nvSpPr>
+          <p:spPr>
+            <a:xfrm>
+              <a:off x="4506320" y="2427648"/>
+              <a:ext cx="179665" cy="163337"/>
+            </a:xfrm>
+            <a:prstGeom prst="rect">
+              <a:avLst/>
+            </a:prstGeom>
+            <a:solidFill>
+              <a:schemeClr val="accent1">
+                <a:alpha val="0"/>
+              </a:schemeClr>
+            </a:solidFill>
+            <a:ln>
+              <a:solidFill>
+                <a:schemeClr val="bg1"/>
+              </a:solidFill>
+            </a:ln>
+          </p:spPr>
+          <p:style>
+            <a:lnRef idx="2">
+              <a:schemeClr val="accent1">
+                <a:shade val="50000"/>
+              </a:schemeClr>
+            </a:lnRef>
+            <a:fillRef idx="1">
+              <a:schemeClr val="accent1"/>
+            </a:fillRef>
+            <a:effectRef idx="0">
+              <a:schemeClr val="accent1"/>
+            </a:effectRef>
+            <a:fontRef idx="minor">
+              <a:schemeClr val="lt1"/>
+            </a:fontRef>
+          </p:style>
+          <p:txBody>
+            <a:bodyPr rtlCol="0" anchor="ctr"/>
+            <a:lstStyle/>
+            <a:p>
+              <a:pPr algn="ctr"/>
+              <a:r>
+                <a:rPr lang="en-US" sz="1600" b="1" dirty="0" smtClean="0">
+                  <a:solidFill>
+                    <a:schemeClr val="tx1"/>
+                  </a:solidFill>
+                  <a:latin typeface="Times New Roman" panose="02020603050405020304" pitchFamily="18" charset="0"/>
+                  <a:cs typeface="Times New Roman" panose="02020603050405020304" pitchFamily="18" charset="0"/>
+                </a:rPr>
+                <a:t>Y</a:t>
+              </a:r>
+              <a:endParaRPr lang="en-US" sz="1600" b="1" dirty="0">
+                <a:solidFill>
+                  <a:schemeClr val="tx1"/>
+                </a:solidFill>
+                <a:latin typeface="Times New Roman" panose="02020603050405020304" pitchFamily="18" charset="0"/>
+                <a:cs typeface="Times New Roman" panose="02020603050405020304" pitchFamily="18" charset="0"/>
+              </a:endParaRPr>
+            </a:p>
+          </p:txBody>
+        </p:sp>
+        <p:sp>
+          <p:nvSpPr>
+            <p:cNvPr id="97" name="Rectangle 96"/>
+            <p:cNvSpPr/>
+            <p:nvPr/>
+          </p:nvSpPr>
+          <p:spPr>
+            <a:xfrm>
+              <a:off x="4929825" y="3219150"/>
+              <a:ext cx="179665" cy="163337"/>
+            </a:xfrm>
+            <a:prstGeom prst="rect">
+              <a:avLst/>
+            </a:prstGeom>
+            <a:solidFill>
+              <a:schemeClr val="accent1">
+                <a:alpha val="0"/>
+              </a:schemeClr>
+            </a:solidFill>
+            <a:ln>
+              <a:solidFill>
+                <a:schemeClr val="bg1"/>
+              </a:solidFill>
+            </a:ln>
+          </p:spPr>
+          <p:style>
+            <a:lnRef idx="2">
+              <a:schemeClr val="accent1">
+                <a:shade val="50000"/>
+              </a:schemeClr>
+            </a:lnRef>
+            <a:fillRef idx="1">
+              <a:schemeClr val="accent1"/>
+            </a:fillRef>
+            <a:effectRef idx="0">
+              <a:schemeClr val="accent1"/>
+            </a:effectRef>
+            <a:fontRef idx="minor">
+              <a:schemeClr val="lt1"/>
+            </a:fontRef>
+          </p:style>
+          <p:txBody>
+            <a:bodyPr rtlCol="0" anchor="ctr"/>
+            <a:lstStyle/>
+            <a:p>
+              <a:pPr algn="ctr"/>
+              <a:r>
+                <a:rPr lang="en-US" sz="1600" b="1" dirty="0">
+                  <a:solidFill>
+                    <a:schemeClr val="tx1"/>
+                  </a:solidFill>
+                  <a:latin typeface="Times New Roman" panose="02020603050405020304" pitchFamily="18" charset="0"/>
+                  <a:cs typeface="Times New Roman" panose="02020603050405020304" pitchFamily="18" charset="0"/>
+                </a:rPr>
+                <a:t>X</a:t>
+              </a:r>
+            </a:p>
+          </p:txBody>
+        </p:sp>
+        <p:sp>
+          <p:nvSpPr>
+            <p:cNvPr id="98" name="Rectangle 97"/>
+            <p:cNvSpPr/>
+            <p:nvPr/>
+          </p:nvSpPr>
+          <p:spPr>
+            <a:xfrm>
+              <a:off x="4936944" y="2032905"/>
+              <a:ext cx="179665" cy="163337"/>
+            </a:xfrm>
+            <a:prstGeom prst="rect">
+              <a:avLst/>
+            </a:prstGeom>
+            <a:solidFill>
+              <a:schemeClr val="accent1">
+                <a:alpha val="0"/>
+              </a:schemeClr>
+            </a:solidFill>
+            <a:ln>
+              <a:solidFill>
+                <a:schemeClr val="bg1"/>
+              </a:solidFill>
+            </a:ln>
+          </p:spPr>
+          <p:style>
+            <a:lnRef idx="2">
+              <a:schemeClr val="accent1">
+                <a:shade val="50000"/>
+              </a:schemeClr>
+            </a:lnRef>
+            <a:fillRef idx="1">
+              <a:schemeClr val="accent1"/>
+            </a:fillRef>
+            <a:effectRef idx="0">
+              <a:schemeClr val="accent1"/>
+            </a:effectRef>
+            <a:fontRef idx="minor">
+              <a:schemeClr val="lt1"/>
+            </a:fontRef>
+          </p:style>
+          <p:txBody>
+            <a:bodyPr rtlCol="0" anchor="ctr"/>
+            <a:lstStyle/>
+            <a:p>
+              <a:pPr algn="ctr"/>
+              <a:r>
+                <a:rPr lang="en-US" sz="1600" b="1" dirty="0">
+                  <a:solidFill>
+                    <a:schemeClr val="tx1"/>
+                  </a:solidFill>
+                  <a:latin typeface="Times New Roman" panose="02020603050405020304" pitchFamily="18" charset="0"/>
+                  <a:cs typeface="Times New Roman" panose="02020603050405020304" pitchFamily="18" charset="0"/>
+                </a:rPr>
+                <a:t>X</a:t>
+              </a:r>
+            </a:p>
+          </p:txBody>
+        </p:sp>
+        <p:sp>
+          <p:nvSpPr>
+            <p:cNvPr id="108" name="Rectangle 107"/>
+            <p:cNvSpPr/>
+            <p:nvPr/>
+          </p:nvSpPr>
+          <p:spPr>
+            <a:xfrm>
+              <a:off x="3130248" y="3037293"/>
+              <a:ext cx="755167" cy="745994"/>
+            </a:xfrm>
+            <a:prstGeom prst="rect">
+              <a:avLst/>
+            </a:prstGeom>
+            <a:solidFill>
+              <a:schemeClr val="accent2">
+                <a:lumMod val="40000"/>
+                <a:lumOff val="60000"/>
+              </a:schemeClr>
+            </a:solidFill>
+            <a:ln w="25400"/>
           </p:spPr>
           <p:style>
             <a:lnRef idx="2">
@@ -4742,38 +5057,72 @@
             <a:lstStyle/>
             <a:p>
               <a:pPr algn="ctr"/>
-              <a:endParaRPr lang="en-US"/>
+              <a:r>
+                <a:rPr lang="en-US" sz="1600" b="1" dirty="0">
+                  <a:latin typeface="Times New Roman" panose="02020603050405020304" pitchFamily="18" charset="0"/>
+                  <a:cs typeface="Times New Roman" panose="02020603050405020304" pitchFamily="18" charset="0"/>
+                </a:rPr>
+                <a:t>DFB</a:t>
+              </a:r>
+            </a:p>
+            <a:p>
+              <a:pPr algn="ctr"/>
+              <a:r>
+                <a:rPr lang="en-US" sz="1600" b="1" dirty="0">
+                  <a:latin typeface="Times New Roman" panose="02020603050405020304" pitchFamily="18" charset="0"/>
+                  <a:cs typeface="Times New Roman" panose="02020603050405020304" pitchFamily="18" charset="0"/>
+                </a:rPr>
+                <a:t>Or</a:t>
+              </a:r>
+            </a:p>
+            <a:p>
+              <a:pPr algn="ctr"/>
+              <a:r>
+                <a:rPr lang="en-US" sz="1600" b="1" dirty="0" smtClean="0">
+                  <a:latin typeface="Times New Roman" panose="02020603050405020304" pitchFamily="18" charset="0"/>
+                  <a:cs typeface="Times New Roman" panose="02020603050405020304" pitchFamily="18" charset="0"/>
+                </a:rPr>
+                <a:t>ECL</a:t>
+              </a:r>
+              <a:endParaRPr lang="en-US" sz="1600" b="1" dirty="0">
+                <a:latin typeface="Times New Roman" panose="02020603050405020304" pitchFamily="18" charset="0"/>
+                <a:cs typeface="Times New Roman" panose="02020603050405020304" pitchFamily="18" charset="0"/>
+              </a:endParaRPr>
             </a:p>
           </p:txBody>
         </p:sp>
         <p:sp>
           <p:nvSpPr>
-            <p:cNvPr id="122" name="Oval 121"/>
+            <p:cNvPr id="103" name="Rectangle 102"/>
             <p:cNvSpPr/>
             <p:nvPr/>
           </p:nvSpPr>
           <p:spPr>
             <a:xfrm>
-              <a:off x="3800732" y="1681220"/>
-              <a:ext cx="313921" cy="557809"/>
+              <a:off x="9278958" y="2282708"/>
+              <a:ext cx="715062" cy="405427"/>
             </a:xfrm>
-            <a:prstGeom prst="ellipse">
+            <a:prstGeom prst="rect">
               <a:avLst/>
             </a:prstGeom>
-            <a:ln w="28575"/>
+            <a:solidFill>
+              <a:srgbClr val="00B0F0"/>
+            </a:solidFill>
           </p:spPr>
           <p:style>
             <a:lnRef idx="2">
-              <a:schemeClr val="dk1"/>
+              <a:schemeClr val="accent1">
+                <a:shade val="50000"/>
+              </a:schemeClr>
             </a:lnRef>
             <a:fillRef idx="1">
-              <a:schemeClr val="lt1"/>
+              <a:schemeClr val="accent1"/>
             </a:fillRef>
             <a:effectRef idx="0">
-              <a:schemeClr val="dk1"/>
+              <a:schemeClr val="accent1"/>
             </a:effectRef>
             <a:fontRef idx="minor">
-              <a:schemeClr val="dk1"/>
+              <a:schemeClr val="lt1"/>
             </a:fontRef>
           </p:style>
           <p:txBody>
@@ -4781,38 +5130,96 @@
             <a:lstStyle/>
             <a:p>
               <a:pPr algn="ctr"/>
-              <a:endParaRPr lang="en-US"/>
+              <a:r>
+                <a:rPr lang="en-US" b="1" dirty="0" smtClean="0">
+                  <a:solidFill>
+                    <a:schemeClr val="tx1"/>
+                  </a:solidFill>
+                  <a:latin typeface="Times New Roman" panose="02020603050405020304" pitchFamily="18" charset="0"/>
+                  <a:cs typeface="Times New Roman" panose="02020603050405020304" pitchFamily="18" charset="0"/>
+                </a:rPr>
+                <a:t>ADC</a:t>
+              </a:r>
+              <a:endParaRPr lang="en-US" b="1" dirty="0">
+                <a:solidFill>
+                  <a:schemeClr val="tx1"/>
+                </a:solidFill>
+                <a:latin typeface="Times New Roman" panose="02020603050405020304" pitchFamily="18" charset="0"/>
+                <a:cs typeface="Times New Roman" panose="02020603050405020304" pitchFamily="18" charset="0"/>
+              </a:endParaRPr>
             </a:p>
           </p:txBody>
         </p:sp>
+        <p:cxnSp>
+          <p:nvCxnSpPr>
+            <p:cNvPr id="112" name="Straight Arrow Connector 111"/>
+            <p:cNvCxnSpPr>
+              <a:endCxn id="113" idx="1"/>
+            </p:cNvCxnSpPr>
+            <p:nvPr/>
+          </p:nvCxnSpPr>
+          <p:spPr>
+            <a:xfrm flipV="1">
+              <a:off x="8780224" y="3685527"/>
+              <a:ext cx="510488" cy="1"/>
+            </a:xfrm>
+            <a:prstGeom prst="straightConnector1">
+              <a:avLst/>
+            </a:prstGeom>
+            <a:ln w="28575">
+              <a:solidFill>
+                <a:srgbClr val="00B050"/>
+              </a:solidFill>
+              <a:tailEnd type="triangle"/>
+            </a:ln>
+          </p:spPr>
+          <p:style>
+            <a:lnRef idx="1">
+              <a:schemeClr val="accent1"/>
+            </a:lnRef>
+            <a:fillRef idx="0">
+              <a:schemeClr val="accent1"/>
+            </a:fillRef>
+            <a:effectRef idx="0">
+              <a:schemeClr val="accent1"/>
+            </a:effectRef>
+            <a:fontRef idx="minor">
+              <a:schemeClr val="tx1"/>
+            </a:fontRef>
+          </p:style>
+        </p:cxnSp>
         <p:sp>
           <p:nvSpPr>
-            <p:cNvPr id="123" name="Oval 122"/>
+            <p:cNvPr id="113" name="Rectangle 112"/>
             <p:cNvSpPr/>
             <p:nvPr/>
           </p:nvSpPr>
           <p:spPr>
             <a:xfrm>
-              <a:off x="3957692" y="1681220"/>
-              <a:ext cx="313921" cy="557809"/>
+              <a:off x="9290712" y="3482813"/>
+              <a:ext cx="715062" cy="405427"/>
             </a:xfrm>
-            <a:prstGeom prst="ellipse">
+            <a:prstGeom prst="rect">
               <a:avLst/>
             </a:prstGeom>
-            <a:ln w="28575"/>
+            <a:solidFill>
+              <a:srgbClr val="00B050"/>
+            </a:solidFill>
           </p:spPr>
           <p:style>
             <a:lnRef idx="2">
-              <a:schemeClr val="dk1"/>
+              <a:schemeClr val="accent1">
+                <a:shade val="50000"/>
+              </a:schemeClr>
             </a:lnRef>
             <a:fillRef idx="1">
-              <a:schemeClr val="lt1"/>
+              <a:schemeClr val="accent1"/>
             </a:fillRef>
             <a:effectRef idx="0">
-              <a:schemeClr val="dk1"/>
+              <a:schemeClr val="accent1"/>
             </a:effectRef>
             <a:fontRef idx="minor">
-              <a:schemeClr val="dk1"/>
+              <a:schemeClr val="lt1"/>
             </a:fontRef>
           </p:style>
           <p:txBody>
@@ -4820,10 +5227,100 @@
             <a:lstStyle/>
             <a:p>
               <a:pPr algn="ctr"/>
-              <a:endParaRPr lang="en-US"/>
+              <a:r>
+                <a:rPr lang="en-US" b="1" dirty="0" smtClean="0">
+                  <a:solidFill>
+                    <a:schemeClr val="tx1"/>
+                  </a:solidFill>
+                  <a:latin typeface="Times New Roman" panose="02020603050405020304" pitchFamily="18" charset="0"/>
+                  <a:cs typeface="Times New Roman" panose="02020603050405020304" pitchFamily="18" charset="0"/>
+                </a:rPr>
+                <a:t>ADC</a:t>
+              </a:r>
+              <a:endParaRPr lang="en-US" b="1" dirty="0">
+                <a:solidFill>
+                  <a:schemeClr val="tx1"/>
+                </a:solidFill>
+                <a:latin typeface="Times New Roman" panose="02020603050405020304" pitchFamily="18" charset="0"/>
+                <a:cs typeface="Times New Roman" panose="02020603050405020304" pitchFamily="18" charset="0"/>
+              </a:endParaRPr>
             </a:p>
           </p:txBody>
         </p:sp>
+        <p:cxnSp>
+          <p:nvCxnSpPr>
+            <p:cNvPr id="114" name="Straight Arrow Connector 113"/>
+            <p:cNvCxnSpPr>
+              <a:stCxn id="103" idx="3"/>
+            </p:cNvCxnSpPr>
+            <p:nvPr/>
+          </p:nvCxnSpPr>
+          <p:spPr>
+            <a:xfrm flipV="1">
+              <a:off x="9994020" y="2485421"/>
+              <a:ext cx="459517" cy="1"/>
+            </a:xfrm>
+            <a:prstGeom prst="straightConnector1">
+              <a:avLst/>
+            </a:prstGeom>
+            <a:ln w="28575">
+              <a:solidFill>
+                <a:srgbClr val="00B0F0"/>
+              </a:solidFill>
+              <a:tailEnd type="triangle"/>
+            </a:ln>
+          </p:spPr>
+          <p:style>
+            <a:lnRef idx="1">
+              <a:schemeClr val="accent1"/>
+            </a:lnRef>
+            <a:fillRef idx="0">
+              <a:schemeClr val="accent1"/>
+            </a:fillRef>
+            <a:effectRef idx="0">
+              <a:schemeClr val="accent1"/>
+            </a:effectRef>
+            <a:fontRef idx="minor">
+              <a:schemeClr val="tx1"/>
+            </a:fontRef>
+          </p:style>
+        </p:cxnSp>
+        <p:cxnSp>
+          <p:nvCxnSpPr>
+            <p:cNvPr id="119" name="Straight Arrow Connector 118"/>
+            <p:cNvCxnSpPr/>
+            <p:nvPr/>
+          </p:nvCxnSpPr>
+          <p:spPr>
+            <a:xfrm flipV="1">
+              <a:off x="10005774" y="3685525"/>
+              <a:ext cx="459517" cy="1"/>
+            </a:xfrm>
+            <a:prstGeom prst="straightConnector1">
+              <a:avLst/>
+            </a:prstGeom>
+            <a:ln w="28575">
+              <a:solidFill>
+                <a:srgbClr val="00B050"/>
+              </a:solidFill>
+              <a:tailEnd type="triangle"/>
+            </a:ln>
+          </p:spPr>
+          <p:style>
+            <a:lnRef idx="1">
+              <a:schemeClr val="accent1"/>
+            </a:lnRef>
+            <a:fillRef idx="0">
+              <a:schemeClr val="accent1"/>
+            </a:fillRef>
+            <a:effectRef idx="0">
+              <a:schemeClr val="accent1"/>
+            </a:effectRef>
+            <a:fontRef idx="minor">
+              <a:schemeClr val="tx1"/>
+            </a:fontRef>
+          </p:style>
+        </p:cxnSp>
       </p:grpSp>
     </p:spTree>
     <p:extLst>

</xml_diff>